<commit_message>
Changes to PNGs (incl transparent backgrounds)
</commit_message>
<xml_diff>
--- a/www/tut/2023 05 03 Tutorial.pptx
+++ b/www/tut/2023 05 03 Tutorial.pptx
@@ -2,7 +2,7 @@
 <file path=ppt/presentation.xml><?xml version="1.0" encoding="utf-8"?>
 <p:presentation xmlns:a="http://schemas.openxmlformats.org/drawingml/2006/main" xmlns:r="http://schemas.openxmlformats.org/officeDocument/2006/relationships" xmlns:p="http://schemas.openxmlformats.org/presentationml/2006/main" saveSubsetFonts="1">
   <p:sldMasterIdLst>
-    <p:sldMasterId id="2147483648" r:id="rId1"/>
+    <p:sldMasterId id="2147483672" r:id="rId1"/>
   </p:sldMasterIdLst>
   <p:sldIdLst>
     <p:sldId id="256" r:id="rId2"/>
@@ -15,13 +15,13 @@
     <p:sldId id="263" r:id="rId9"/>
     <p:sldId id="264" r:id="rId10"/>
   </p:sldIdLst>
-  <p:sldSz cx="6858000" cy="12192000"/>
+  <p:sldSz cx="6858000" cy="8231188"/>
   <p:notesSz cx="6858000" cy="9144000"/>
   <p:defaultTextStyle>
     <a:defPPr>
-      <a:defRPr lang="de-DE"/>
+      <a:defRPr lang="en-US"/>
     </a:defPPr>
-    <a:lvl1pPr marL="0" algn="l" defTabSz="914400" rtl="0" eaLnBrk="1" latinLnBrk="0" hangingPunct="1">
+    <a:lvl1pPr marL="0" algn="l" defTabSz="457200" rtl="0" eaLnBrk="1" latinLnBrk="0" hangingPunct="1">
       <a:defRPr sz="1800" kern="1200">
         <a:solidFill>
           <a:schemeClr val="tx1"/>
@@ -31,7 +31,7 @@
         <a:cs typeface="+mn-cs"/>
       </a:defRPr>
     </a:lvl1pPr>
-    <a:lvl2pPr marL="457200" algn="l" defTabSz="914400" rtl="0" eaLnBrk="1" latinLnBrk="0" hangingPunct="1">
+    <a:lvl2pPr marL="457200" algn="l" defTabSz="457200" rtl="0" eaLnBrk="1" latinLnBrk="0" hangingPunct="1">
       <a:defRPr sz="1800" kern="1200">
         <a:solidFill>
           <a:schemeClr val="tx1"/>
@@ -41,7 +41,7 @@
         <a:cs typeface="+mn-cs"/>
       </a:defRPr>
     </a:lvl2pPr>
-    <a:lvl3pPr marL="914400" algn="l" defTabSz="914400" rtl="0" eaLnBrk="1" latinLnBrk="0" hangingPunct="1">
+    <a:lvl3pPr marL="914400" algn="l" defTabSz="457200" rtl="0" eaLnBrk="1" latinLnBrk="0" hangingPunct="1">
       <a:defRPr sz="1800" kern="1200">
         <a:solidFill>
           <a:schemeClr val="tx1"/>
@@ -51,7 +51,7 @@
         <a:cs typeface="+mn-cs"/>
       </a:defRPr>
     </a:lvl3pPr>
-    <a:lvl4pPr marL="1371600" algn="l" defTabSz="914400" rtl="0" eaLnBrk="1" latinLnBrk="0" hangingPunct="1">
+    <a:lvl4pPr marL="1371600" algn="l" defTabSz="457200" rtl="0" eaLnBrk="1" latinLnBrk="0" hangingPunct="1">
       <a:defRPr sz="1800" kern="1200">
         <a:solidFill>
           <a:schemeClr val="tx1"/>
@@ -61,7 +61,7 @@
         <a:cs typeface="+mn-cs"/>
       </a:defRPr>
     </a:lvl4pPr>
-    <a:lvl5pPr marL="1828800" algn="l" defTabSz="914400" rtl="0" eaLnBrk="1" latinLnBrk="0" hangingPunct="1">
+    <a:lvl5pPr marL="1828800" algn="l" defTabSz="457200" rtl="0" eaLnBrk="1" latinLnBrk="0" hangingPunct="1">
       <a:defRPr sz="1800" kern="1200">
         <a:solidFill>
           <a:schemeClr val="tx1"/>
@@ -71,7 +71,7 @@
         <a:cs typeface="+mn-cs"/>
       </a:defRPr>
     </a:lvl5pPr>
-    <a:lvl6pPr marL="2286000" algn="l" defTabSz="914400" rtl="0" eaLnBrk="1" latinLnBrk="0" hangingPunct="1">
+    <a:lvl6pPr marL="2286000" algn="l" defTabSz="457200" rtl="0" eaLnBrk="1" latinLnBrk="0" hangingPunct="1">
       <a:defRPr sz="1800" kern="1200">
         <a:solidFill>
           <a:schemeClr val="tx1"/>
@@ -81,7 +81,7 @@
         <a:cs typeface="+mn-cs"/>
       </a:defRPr>
     </a:lvl6pPr>
-    <a:lvl7pPr marL="2743200" algn="l" defTabSz="914400" rtl="0" eaLnBrk="1" latinLnBrk="0" hangingPunct="1">
+    <a:lvl7pPr marL="2743200" algn="l" defTabSz="457200" rtl="0" eaLnBrk="1" latinLnBrk="0" hangingPunct="1">
       <a:defRPr sz="1800" kern="1200">
         <a:solidFill>
           <a:schemeClr val="tx1"/>
@@ -91,7 +91,7 @@
         <a:cs typeface="+mn-cs"/>
       </a:defRPr>
     </a:lvl7pPr>
-    <a:lvl8pPr marL="3200400" algn="l" defTabSz="914400" rtl="0" eaLnBrk="1" latinLnBrk="0" hangingPunct="1">
+    <a:lvl8pPr marL="3200400" algn="l" defTabSz="457200" rtl="0" eaLnBrk="1" latinLnBrk="0" hangingPunct="1">
       <a:defRPr sz="1800" kern="1200">
         <a:solidFill>
           <a:schemeClr val="tx1"/>
@@ -101,7 +101,7 @@
         <a:cs typeface="+mn-cs"/>
       </a:defRPr>
     </a:lvl8pPr>
-    <a:lvl9pPr marL="3657600" algn="l" defTabSz="914400" rtl="0" eaLnBrk="1" latinLnBrk="0" hangingPunct="1">
+    <a:lvl9pPr marL="3657600" algn="l" defTabSz="457200" rtl="0" eaLnBrk="1" latinLnBrk="0" hangingPunct="1">
       <a:defRPr sz="1800" kern="1200">
         <a:solidFill>
           <a:schemeClr val="tx1"/>
@@ -182,15 +182,15 @@
         </p:nvSpPr>
         <p:spPr>
           <a:xfrm>
-            <a:off x="857250" y="1995312"/>
-            <a:ext cx="5143500" cy="4244622"/>
+            <a:off x="514350" y="1347095"/>
+            <a:ext cx="5829300" cy="2865673"/>
           </a:xfrm>
         </p:spPr>
         <p:txBody>
           <a:bodyPr anchor="b"/>
           <a:lstStyle>
             <a:lvl1pPr algn="ctr">
-              <a:defRPr sz="3375"/>
+              <a:defRPr sz="4500"/>
             </a:lvl1pPr>
           </a:lstStyle>
           <a:p>
@@ -198,7 +198,7 @@
               <a:rPr lang="en-US" smtClean="0"/>
               <a:t>Click to edit Master title style</a:t>
             </a:r>
-            <a:endParaRPr lang="de-DE"/>
+            <a:endParaRPr lang="en-US" dirty="0"/>
           </a:p>
         </p:txBody>
       </p:sp>
@@ -214,8 +214,8 @@
         </p:nvSpPr>
         <p:spPr>
           <a:xfrm>
-            <a:off x="857250" y="6403623"/>
-            <a:ext cx="5143500" cy="2943577"/>
+            <a:off x="857250" y="4323280"/>
+            <a:ext cx="5143500" cy="1987298"/>
           </a:xfrm>
         </p:spPr>
         <p:txBody>
@@ -223,39 +223,39 @@
           <a:lstStyle>
             <a:lvl1pPr marL="0" indent="0" algn="ctr">
               <a:buNone/>
+              <a:defRPr sz="1800"/>
+            </a:lvl1pPr>
+            <a:lvl2pPr marL="342900" indent="0" algn="ctr">
+              <a:buNone/>
+              <a:defRPr sz="1500"/>
+            </a:lvl2pPr>
+            <a:lvl3pPr marL="685800" indent="0" algn="ctr">
+              <a:buNone/>
               <a:defRPr sz="1350"/>
-            </a:lvl1pPr>
-            <a:lvl2pPr marL="257175" indent="0" algn="ctr">
-              <a:buNone/>
-              <a:defRPr sz="1125"/>
-            </a:lvl2pPr>
-            <a:lvl3pPr marL="514350" indent="0" algn="ctr">
-              <a:buNone/>
-              <a:defRPr sz="1013"/>
             </a:lvl3pPr>
-            <a:lvl4pPr marL="771525" indent="0" algn="ctr">
-              <a:buNone/>
-              <a:defRPr sz="900"/>
+            <a:lvl4pPr marL="1028700" indent="0" algn="ctr">
+              <a:buNone/>
+              <a:defRPr sz="1200"/>
             </a:lvl4pPr>
-            <a:lvl5pPr marL="1028700" indent="0" algn="ctr">
-              <a:buNone/>
-              <a:defRPr sz="900"/>
+            <a:lvl5pPr marL="1371600" indent="0" algn="ctr">
+              <a:buNone/>
+              <a:defRPr sz="1200"/>
             </a:lvl5pPr>
-            <a:lvl6pPr marL="1285875" indent="0" algn="ctr">
-              <a:buNone/>
-              <a:defRPr sz="900"/>
+            <a:lvl6pPr marL="1714500" indent="0" algn="ctr">
+              <a:buNone/>
+              <a:defRPr sz="1200"/>
             </a:lvl6pPr>
-            <a:lvl7pPr marL="1543050" indent="0" algn="ctr">
-              <a:buNone/>
-              <a:defRPr sz="900"/>
+            <a:lvl7pPr marL="2057400" indent="0" algn="ctr">
+              <a:buNone/>
+              <a:defRPr sz="1200"/>
             </a:lvl7pPr>
-            <a:lvl8pPr marL="1800225" indent="0" algn="ctr">
-              <a:buNone/>
-              <a:defRPr sz="900"/>
+            <a:lvl8pPr marL="2400300" indent="0" algn="ctr">
+              <a:buNone/>
+              <a:defRPr sz="1200"/>
             </a:lvl8pPr>
-            <a:lvl9pPr marL="2057400" indent="0" algn="ctr">
-              <a:buNone/>
-              <a:defRPr sz="900"/>
+            <a:lvl9pPr marL="2743200" indent="0" algn="ctr">
+              <a:buNone/>
+              <a:defRPr sz="1200"/>
             </a:lvl9pPr>
           </a:lstStyle>
           <a:p>
@@ -263,7 +263,7 @@
               <a:rPr lang="en-US" smtClean="0"/>
               <a:t>Click to edit Master subtitle style</a:t>
             </a:r>
-            <a:endParaRPr lang="de-DE"/>
+            <a:endParaRPr lang="en-US" dirty="0"/>
           </a:p>
         </p:txBody>
       </p:sp>
@@ -335,7 +335,7 @@
     </p:spTree>
     <p:extLst>
       <p:ext uri="{BB962C8B-B14F-4D97-AF65-F5344CB8AC3E}">
-        <p14:creationId xmlns:p14="http://schemas.microsoft.com/office/powerpoint/2010/main" val="3954191302"/>
+        <p14:creationId xmlns:p14="http://schemas.microsoft.com/office/powerpoint/2010/main" val="2385155241"/>
       </p:ext>
     </p:extLst>
   </p:cSld>
@@ -381,7 +381,7 @@
               <a:rPr lang="en-US" smtClean="0"/>
               <a:t>Click to edit Master title style</a:t>
             </a:r>
-            <a:endParaRPr lang="de-DE"/>
+            <a:endParaRPr lang="en-US" dirty="0"/>
           </a:p>
         </p:txBody>
       </p:sp>
@@ -433,7 +433,7 @@
               <a:rPr lang="en-US" smtClean="0"/>
               <a:t>Fifth level</a:t>
             </a:r>
-            <a:endParaRPr lang="de-DE"/>
+            <a:endParaRPr lang="en-US" dirty="0"/>
           </a:p>
         </p:txBody>
       </p:sp>
@@ -505,7 +505,7 @@
     </p:spTree>
     <p:extLst>
       <p:ext uri="{BB962C8B-B14F-4D97-AF65-F5344CB8AC3E}">
-        <p14:creationId xmlns:p14="http://schemas.microsoft.com/office/powerpoint/2010/main" val="141474779"/>
+        <p14:creationId xmlns:p14="http://schemas.microsoft.com/office/powerpoint/2010/main" val="3638842254"/>
       </p:ext>
     </p:extLst>
   </p:cSld>
@@ -544,8 +544,8 @@
         </p:nvSpPr>
         <p:spPr>
           <a:xfrm>
-            <a:off x="4907756" y="649111"/>
-            <a:ext cx="1478756" cy="10332156"/>
+            <a:off x="4907757" y="438235"/>
+            <a:ext cx="1478756" cy="6975551"/>
           </a:xfrm>
         </p:spPr>
         <p:txBody>
@@ -556,7 +556,7 @@
               <a:rPr lang="en-US" smtClean="0"/>
               <a:t>Click to edit Master title style</a:t>
             </a:r>
-            <a:endParaRPr lang="de-DE"/>
+            <a:endParaRPr lang="en-US" dirty="0"/>
           </a:p>
         </p:txBody>
       </p:sp>
@@ -572,8 +572,8 @@
         </p:nvSpPr>
         <p:spPr>
           <a:xfrm>
-            <a:off x="471487" y="649111"/>
-            <a:ext cx="4350544" cy="10332156"/>
+            <a:off x="471488" y="438235"/>
+            <a:ext cx="4350544" cy="6975551"/>
           </a:xfrm>
         </p:spPr>
         <p:txBody>
@@ -613,7 +613,7 @@
               <a:rPr lang="en-US" smtClean="0"/>
               <a:t>Fifth level</a:t>
             </a:r>
-            <a:endParaRPr lang="de-DE"/>
+            <a:endParaRPr lang="en-US" dirty="0"/>
           </a:p>
         </p:txBody>
       </p:sp>
@@ -685,7 +685,7 @@
     </p:spTree>
     <p:extLst>
       <p:ext uri="{BB962C8B-B14F-4D97-AF65-F5344CB8AC3E}">
-        <p14:creationId xmlns:p14="http://schemas.microsoft.com/office/powerpoint/2010/main" val="81410003"/>
+        <p14:creationId xmlns:p14="http://schemas.microsoft.com/office/powerpoint/2010/main" val="815889489"/>
       </p:ext>
     </p:extLst>
   </p:cSld>
@@ -731,7 +731,7 @@
               <a:rPr lang="en-US" smtClean="0"/>
               <a:t>Click to edit Master title style</a:t>
             </a:r>
-            <a:endParaRPr lang="de-DE"/>
+            <a:endParaRPr lang="en-US" dirty="0"/>
           </a:p>
         </p:txBody>
       </p:sp>
@@ -783,7 +783,7 @@
               <a:rPr lang="en-US" smtClean="0"/>
               <a:t>Fifth level</a:t>
             </a:r>
-            <a:endParaRPr lang="de-DE"/>
+            <a:endParaRPr lang="en-US" dirty="0"/>
           </a:p>
         </p:txBody>
       </p:sp>
@@ -855,7 +855,7 @@
     </p:spTree>
     <p:extLst>
       <p:ext uri="{BB962C8B-B14F-4D97-AF65-F5344CB8AC3E}">
-        <p14:creationId xmlns:p14="http://schemas.microsoft.com/office/powerpoint/2010/main" val="1207469842"/>
+        <p14:creationId xmlns:p14="http://schemas.microsoft.com/office/powerpoint/2010/main" val="4089636475"/>
       </p:ext>
     </p:extLst>
   </p:cSld>
@@ -894,15 +894,15 @@
         </p:nvSpPr>
         <p:spPr>
           <a:xfrm>
-            <a:off x="467916" y="3039535"/>
-            <a:ext cx="5915025" cy="5071532"/>
+            <a:off x="467916" y="2052083"/>
+            <a:ext cx="5915025" cy="3423945"/>
           </a:xfrm>
         </p:spPr>
         <p:txBody>
           <a:bodyPr anchor="b"/>
           <a:lstStyle>
             <a:lvl1pPr>
-              <a:defRPr sz="3375"/>
+              <a:defRPr sz="4500"/>
             </a:lvl1pPr>
           </a:lstStyle>
           <a:p>
@@ -910,7 +910,7 @@
               <a:rPr lang="en-US" smtClean="0"/>
               <a:t>Click to edit Master title style</a:t>
             </a:r>
-            <a:endParaRPr lang="de-DE"/>
+            <a:endParaRPr lang="en-US" dirty="0"/>
           </a:p>
         </p:txBody>
       </p:sp>
@@ -926,14 +926,32 @@
         </p:nvSpPr>
         <p:spPr>
           <a:xfrm>
-            <a:off x="467916" y="8159046"/>
-            <a:ext cx="5915025" cy="2666999"/>
+            <a:off x="467916" y="5508420"/>
+            <a:ext cx="5915025" cy="1800572"/>
           </a:xfrm>
         </p:spPr>
         <p:txBody>
           <a:bodyPr/>
           <a:lstStyle>
             <a:lvl1pPr marL="0" indent="0">
+              <a:buNone/>
+              <a:defRPr sz="1800">
+                <a:solidFill>
+                  <a:schemeClr val="tx1"/>
+                </a:solidFill>
+              </a:defRPr>
+            </a:lvl1pPr>
+            <a:lvl2pPr marL="342900" indent="0">
+              <a:buNone/>
+              <a:defRPr sz="1500">
+                <a:solidFill>
+                  <a:schemeClr val="tx1">
+                    <a:tint val="75000"/>
+                  </a:schemeClr>
+                </a:solidFill>
+              </a:defRPr>
+            </a:lvl2pPr>
+            <a:lvl3pPr marL="685800" indent="0">
               <a:buNone/>
               <a:defRPr sz="1350">
                 <a:solidFill>
@@ -942,30 +960,10 @@
                   </a:schemeClr>
                 </a:solidFill>
               </a:defRPr>
-            </a:lvl1pPr>
-            <a:lvl2pPr marL="257175" indent="0">
-              <a:buNone/>
-              <a:defRPr sz="1125">
-                <a:solidFill>
-                  <a:schemeClr val="tx1">
-                    <a:tint val="75000"/>
-                  </a:schemeClr>
-                </a:solidFill>
-              </a:defRPr>
-            </a:lvl2pPr>
-            <a:lvl3pPr marL="514350" indent="0">
-              <a:buNone/>
-              <a:defRPr sz="1013">
-                <a:solidFill>
-                  <a:schemeClr val="tx1">
-                    <a:tint val="75000"/>
-                  </a:schemeClr>
-                </a:solidFill>
-              </a:defRPr>
             </a:lvl3pPr>
-            <a:lvl4pPr marL="771525" indent="0">
-              <a:buNone/>
-              <a:defRPr sz="900">
+            <a:lvl4pPr marL="1028700" indent="0">
+              <a:buNone/>
+              <a:defRPr sz="1200">
                 <a:solidFill>
                   <a:schemeClr val="tx1">
                     <a:tint val="75000"/>
@@ -973,9 +971,9 @@
                 </a:solidFill>
               </a:defRPr>
             </a:lvl4pPr>
-            <a:lvl5pPr marL="1028700" indent="0">
-              <a:buNone/>
-              <a:defRPr sz="900">
+            <a:lvl5pPr marL="1371600" indent="0">
+              <a:buNone/>
+              <a:defRPr sz="1200">
                 <a:solidFill>
                   <a:schemeClr val="tx1">
                     <a:tint val="75000"/>
@@ -983,9 +981,9 @@
                 </a:solidFill>
               </a:defRPr>
             </a:lvl5pPr>
-            <a:lvl6pPr marL="1285875" indent="0">
-              <a:buNone/>
-              <a:defRPr sz="900">
+            <a:lvl6pPr marL="1714500" indent="0">
+              <a:buNone/>
+              <a:defRPr sz="1200">
                 <a:solidFill>
                   <a:schemeClr val="tx1">
                     <a:tint val="75000"/>
@@ -993,9 +991,9 @@
                 </a:solidFill>
               </a:defRPr>
             </a:lvl6pPr>
-            <a:lvl7pPr marL="1543050" indent="0">
-              <a:buNone/>
-              <a:defRPr sz="900">
+            <a:lvl7pPr marL="2057400" indent="0">
+              <a:buNone/>
+              <a:defRPr sz="1200">
                 <a:solidFill>
                   <a:schemeClr val="tx1">
                     <a:tint val="75000"/>
@@ -1003,9 +1001,9 @@
                 </a:solidFill>
               </a:defRPr>
             </a:lvl7pPr>
-            <a:lvl8pPr marL="1800225" indent="0">
-              <a:buNone/>
-              <a:defRPr sz="900">
+            <a:lvl8pPr marL="2400300" indent="0">
+              <a:buNone/>
+              <a:defRPr sz="1200">
                 <a:solidFill>
                   <a:schemeClr val="tx1">
                     <a:tint val="75000"/>
@@ -1013,9 +1011,9 @@
                 </a:solidFill>
               </a:defRPr>
             </a:lvl8pPr>
-            <a:lvl9pPr marL="2057400" indent="0">
-              <a:buNone/>
-              <a:defRPr sz="900">
+            <a:lvl9pPr marL="2743200" indent="0">
+              <a:buNone/>
+              <a:defRPr sz="1200">
                 <a:solidFill>
                   <a:schemeClr val="tx1">
                     <a:tint val="75000"/>
@@ -1101,7 +1099,7 @@
     </p:spTree>
     <p:extLst>
       <p:ext uri="{BB962C8B-B14F-4D97-AF65-F5344CB8AC3E}">
-        <p14:creationId xmlns:p14="http://schemas.microsoft.com/office/powerpoint/2010/main" val="2488957929"/>
+        <p14:creationId xmlns:p14="http://schemas.microsoft.com/office/powerpoint/2010/main" val="4261796844"/>
       </p:ext>
     </p:extLst>
   </p:cSld>
@@ -1147,7 +1145,7 @@
               <a:rPr lang="en-US" smtClean="0"/>
               <a:t>Click to edit Master title style</a:t>
             </a:r>
-            <a:endParaRPr lang="de-DE"/>
+            <a:endParaRPr lang="en-US" dirty="0"/>
           </a:p>
         </p:txBody>
       </p:sp>
@@ -1163,8 +1161,8 @@
         </p:nvSpPr>
         <p:spPr>
           <a:xfrm>
-            <a:off x="471488" y="3245556"/>
-            <a:ext cx="2914650" cy="7735712"/>
+            <a:off x="471488" y="2191173"/>
+            <a:ext cx="2914650" cy="5222613"/>
           </a:xfrm>
         </p:spPr>
         <p:txBody>
@@ -1204,7 +1202,7 @@
               <a:rPr lang="en-US" smtClean="0"/>
               <a:t>Fifth level</a:t>
             </a:r>
-            <a:endParaRPr lang="de-DE"/>
+            <a:endParaRPr lang="en-US" dirty="0"/>
           </a:p>
         </p:txBody>
       </p:sp>
@@ -1220,8 +1218,8 @@
         </p:nvSpPr>
         <p:spPr>
           <a:xfrm>
-            <a:off x="3471863" y="3245556"/>
-            <a:ext cx="2914650" cy="7735712"/>
+            <a:off x="3471863" y="2191173"/>
+            <a:ext cx="2914650" cy="5222613"/>
           </a:xfrm>
         </p:spPr>
         <p:txBody>
@@ -1261,7 +1259,7 @@
               <a:rPr lang="en-US" smtClean="0"/>
               <a:t>Fifth level</a:t>
             </a:r>
-            <a:endParaRPr lang="de-DE"/>
+            <a:endParaRPr lang="en-US" dirty="0"/>
           </a:p>
         </p:txBody>
       </p:sp>
@@ -1333,7 +1331,7 @@
     </p:spTree>
     <p:extLst>
       <p:ext uri="{BB962C8B-B14F-4D97-AF65-F5344CB8AC3E}">
-        <p14:creationId xmlns:p14="http://schemas.microsoft.com/office/powerpoint/2010/main" val="4148032779"/>
+        <p14:creationId xmlns:p14="http://schemas.microsoft.com/office/powerpoint/2010/main" val="1106080587"/>
       </p:ext>
     </p:extLst>
   </p:cSld>
@@ -1372,8 +1370,8 @@
         </p:nvSpPr>
         <p:spPr>
           <a:xfrm>
-            <a:off x="472381" y="649112"/>
-            <a:ext cx="5915025" cy="2356556"/>
+            <a:off x="472381" y="438236"/>
+            <a:ext cx="5915025" cy="1590983"/>
           </a:xfrm>
         </p:spPr>
         <p:txBody>
@@ -1384,7 +1382,7 @@
               <a:rPr lang="en-US" smtClean="0"/>
               <a:t>Click to edit Master title style</a:t>
             </a:r>
-            <a:endParaRPr lang="de-DE"/>
+            <a:endParaRPr lang="en-US" dirty="0"/>
           </a:p>
         </p:txBody>
       </p:sp>
@@ -1400,8 +1398,8 @@
         </p:nvSpPr>
         <p:spPr>
           <a:xfrm>
-            <a:off x="472381" y="2988734"/>
-            <a:ext cx="2901255" cy="1464732"/>
+            <a:off x="472381" y="2017785"/>
+            <a:ext cx="2901255" cy="988885"/>
           </a:xfrm>
         </p:spPr>
         <p:txBody>
@@ -1409,39 +1407,39 @@
           <a:lstStyle>
             <a:lvl1pPr marL="0" indent="0">
               <a:buNone/>
+              <a:defRPr sz="1800" b="1"/>
+            </a:lvl1pPr>
+            <a:lvl2pPr marL="342900" indent="0">
+              <a:buNone/>
+              <a:defRPr sz="1500" b="1"/>
+            </a:lvl2pPr>
+            <a:lvl3pPr marL="685800" indent="0">
+              <a:buNone/>
               <a:defRPr sz="1350" b="1"/>
-            </a:lvl1pPr>
-            <a:lvl2pPr marL="257175" indent="0">
-              <a:buNone/>
-              <a:defRPr sz="1125" b="1"/>
-            </a:lvl2pPr>
-            <a:lvl3pPr marL="514350" indent="0">
-              <a:buNone/>
-              <a:defRPr sz="1013" b="1"/>
             </a:lvl3pPr>
-            <a:lvl4pPr marL="771525" indent="0">
-              <a:buNone/>
-              <a:defRPr sz="900" b="1"/>
+            <a:lvl4pPr marL="1028700" indent="0">
+              <a:buNone/>
+              <a:defRPr sz="1200" b="1"/>
             </a:lvl4pPr>
-            <a:lvl5pPr marL="1028700" indent="0">
-              <a:buNone/>
-              <a:defRPr sz="900" b="1"/>
+            <a:lvl5pPr marL="1371600" indent="0">
+              <a:buNone/>
+              <a:defRPr sz="1200" b="1"/>
             </a:lvl5pPr>
-            <a:lvl6pPr marL="1285875" indent="0">
-              <a:buNone/>
-              <a:defRPr sz="900" b="1"/>
+            <a:lvl6pPr marL="1714500" indent="0">
+              <a:buNone/>
+              <a:defRPr sz="1200" b="1"/>
             </a:lvl6pPr>
-            <a:lvl7pPr marL="1543050" indent="0">
-              <a:buNone/>
-              <a:defRPr sz="900" b="1"/>
+            <a:lvl7pPr marL="2057400" indent="0">
+              <a:buNone/>
+              <a:defRPr sz="1200" b="1"/>
             </a:lvl7pPr>
-            <a:lvl8pPr marL="1800225" indent="0">
-              <a:buNone/>
-              <a:defRPr sz="900" b="1"/>
+            <a:lvl8pPr marL="2400300" indent="0">
+              <a:buNone/>
+              <a:defRPr sz="1200" b="1"/>
             </a:lvl8pPr>
-            <a:lvl9pPr marL="2057400" indent="0">
-              <a:buNone/>
-              <a:defRPr sz="900" b="1"/>
+            <a:lvl9pPr marL="2743200" indent="0">
+              <a:buNone/>
+              <a:defRPr sz="1200" b="1"/>
             </a:lvl9pPr>
           </a:lstStyle>
           <a:p>
@@ -1465,8 +1463,8 @@
         </p:nvSpPr>
         <p:spPr>
           <a:xfrm>
-            <a:off x="472381" y="4453467"/>
-            <a:ext cx="2901255" cy="6550379"/>
+            <a:off x="472381" y="3006670"/>
+            <a:ext cx="2901255" cy="4422359"/>
           </a:xfrm>
         </p:spPr>
         <p:txBody>
@@ -1506,7 +1504,7 @@
               <a:rPr lang="en-US" smtClean="0"/>
               <a:t>Fifth level</a:t>
             </a:r>
-            <a:endParaRPr lang="de-DE"/>
+            <a:endParaRPr lang="en-US" dirty="0"/>
           </a:p>
         </p:txBody>
       </p:sp>
@@ -1522,8 +1520,8 @@
         </p:nvSpPr>
         <p:spPr>
           <a:xfrm>
-            <a:off x="3471863" y="2988734"/>
-            <a:ext cx="2915543" cy="1464732"/>
+            <a:off x="3471863" y="2017785"/>
+            <a:ext cx="2915543" cy="988885"/>
           </a:xfrm>
         </p:spPr>
         <p:txBody>
@@ -1531,39 +1529,39 @@
           <a:lstStyle>
             <a:lvl1pPr marL="0" indent="0">
               <a:buNone/>
+              <a:defRPr sz="1800" b="1"/>
+            </a:lvl1pPr>
+            <a:lvl2pPr marL="342900" indent="0">
+              <a:buNone/>
+              <a:defRPr sz="1500" b="1"/>
+            </a:lvl2pPr>
+            <a:lvl3pPr marL="685800" indent="0">
+              <a:buNone/>
               <a:defRPr sz="1350" b="1"/>
-            </a:lvl1pPr>
-            <a:lvl2pPr marL="257175" indent="0">
-              <a:buNone/>
-              <a:defRPr sz="1125" b="1"/>
-            </a:lvl2pPr>
-            <a:lvl3pPr marL="514350" indent="0">
-              <a:buNone/>
-              <a:defRPr sz="1013" b="1"/>
             </a:lvl3pPr>
-            <a:lvl4pPr marL="771525" indent="0">
-              <a:buNone/>
-              <a:defRPr sz="900" b="1"/>
+            <a:lvl4pPr marL="1028700" indent="0">
+              <a:buNone/>
+              <a:defRPr sz="1200" b="1"/>
             </a:lvl4pPr>
-            <a:lvl5pPr marL="1028700" indent="0">
-              <a:buNone/>
-              <a:defRPr sz="900" b="1"/>
+            <a:lvl5pPr marL="1371600" indent="0">
+              <a:buNone/>
+              <a:defRPr sz="1200" b="1"/>
             </a:lvl5pPr>
-            <a:lvl6pPr marL="1285875" indent="0">
-              <a:buNone/>
-              <a:defRPr sz="900" b="1"/>
+            <a:lvl6pPr marL="1714500" indent="0">
+              <a:buNone/>
+              <a:defRPr sz="1200" b="1"/>
             </a:lvl6pPr>
-            <a:lvl7pPr marL="1543050" indent="0">
-              <a:buNone/>
-              <a:defRPr sz="900" b="1"/>
+            <a:lvl7pPr marL="2057400" indent="0">
+              <a:buNone/>
+              <a:defRPr sz="1200" b="1"/>
             </a:lvl7pPr>
-            <a:lvl8pPr marL="1800225" indent="0">
-              <a:buNone/>
-              <a:defRPr sz="900" b="1"/>
+            <a:lvl8pPr marL="2400300" indent="0">
+              <a:buNone/>
+              <a:defRPr sz="1200" b="1"/>
             </a:lvl8pPr>
-            <a:lvl9pPr marL="2057400" indent="0">
-              <a:buNone/>
-              <a:defRPr sz="900" b="1"/>
+            <a:lvl9pPr marL="2743200" indent="0">
+              <a:buNone/>
+              <a:defRPr sz="1200" b="1"/>
             </a:lvl9pPr>
           </a:lstStyle>
           <a:p>
@@ -1587,8 +1585,8 @@
         </p:nvSpPr>
         <p:spPr>
           <a:xfrm>
-            <a:off x="3471863" y="4453467"/>
-            <a:ext cx="2915543" cy="6550379"/>
+            <a:off x="3471863" y="3006670"/>
+            <a:ext cx="2915543" cy="4422359"/>
           </a:xfrm>
         </p:spPr>
         <p:txBody>
@@ -1628,7 +1626,7 @@
               <a:rPr lang="en-US" smtClean="0"/>
               <a:t>Fifth level</a:t>
             </a:r>
-            <a:endParaRPr lang="de-DE"/>
+            <a:endParaRPr lang="en-US" dirty="0"/>
           </a:p>
         </p:txBody>
       </p:sp>
@@ -1700,7 +1698,7 @@
     </p:spTree>
     <p:extLst>
       <p:ext uri="{BB962C8B-B14F-4D97-AF65-F5344CB8AC3E}">
-        <p14:creationId xmlns:p14="http://schemas.microsoft.com/office/powerpoint/2010/main" val="385614564"/>
+        <p14:creationId xmlns:p14="http://schemas.microsoft.com/office/powerpoint/2010/main" val="1703848242"/>
       </p:ext>
     </p:extLst>
   </p:cSld>
@@ -1746,7 +1744,7 @@
               <a:rPr lang="en-US" smtClean="0"/>
               <a:t>Click to edit Master title style</a:t>
             </a:r>
-            <a:endParaRPr lang="de-DE"/>
+            <a:endParaRPr lang="en-US" dirty="0"/>
           </a:p>
         </p:txBody>
       </p:sp>
@@ -1818,7 +1816,7 @@
     </p:spTree>
     <p:extLst>
       <p:ext uri="{BB962C8B-B14F-4D97-AF65-F5344CB8AC3E}">
-        <p14:creationId xmlns:p14="http://schemas.microsoft.com/office/powerpoint/2010/main" val="1110441077"/>
+        <p14:creationId xmlns:p14="http://schemas.microsoft.com/office/powerpoint/2010/main" val="742379284"/>
       </p:ext>
     </p:extLst>
   </p:cSld>
@@ -1913,7 +1911,7 @@
     </p:spTree>
     <p:extLst>
       <p:ext uri="{BB962C8B-B14F-4D97-AF65-F5344CB8AC3E}">
-        <p14:creationId xmlns:p14="http://schemas.microsoft.com/office/powerpoint/2010/main" val="3223017044"/>
+        <p14:creationId xmlns:p14="http://schemas.microsoft.com/office/powerpoint/2010/main" val="2770294456"/>
       </p:ext>
     </p:extLst>
   </p:cSld>
@@ -1952,15 +1950,15 @@
         </p:nvSpPr>
         <p:spPr>
           <a:xfrm>
-            <a:off x="472381" y="812800"/>
-            <a:ext cx="2211883" cy="2844800"/>
+            <a:off x="472381" y="548746"/>
+            <a:ext cx="2211884" cy="1920611"/>
           </a:xfrm>
         </p:spPr>
         <p:txBody>
           <a:bodyPr anchor="b"/>
           <a:lstStyle>
             <a:lvl1pPr>
-              <a:defRPr sz="1800"/>
+              <a:defRPr sz="2400"/>
             </a:lvl1pPr>
           </a:lstStyle>
           <a:p>
@@ -1968,7 +1966,7 @@
               <a:rPr lang="en-US" smtClean="0"/>
               <a:t>Click to edit Master title style</a:t>
             </a:r>
-            <a:endParaRPr lang="de-DE"/>
+            <a:endParaRPr lang="en-US" dirty="0"/>
           </a:p>
         </p:txBody>
       </p:sp>
@@ -1984,39 +1982,39 @@
         </p:nvSpPr>
         <p:spPr>
           <a:xfrm>
-            <a:off x="2915543" y="1755423"/>
-            <a:ext cx="3471863" cy="8664222"/>
+            <a:off x="2915543" y="1185140"/>
+            <a:ext cx="3471863" cy="5849479"/>
           </a:xfrm>
         </p:spPr>
         <p:txBody>
           <a:bodyPr/>
           <a:lstStyle>
             <a:lvl1pPr>
-              <a:defRPr sz="1800"/>
+              <a:defRPr sz="2400"/>
             </a:lvl1pPr>
             <a:lvl2pPr>
-              <a:defRPr sz="1575"/>
+              <a:defRPr sz="2100"/>
             </a:lvl2pPr>
             <a:lvl3pPr>
-              <a:defRPr sz="1350"/>
+              <a:defRPr sz="1800"/>
             </a:lvl3pPr>
             <a:lvl4pPr>
-              <a:defRPr sz="1125"/>
+              <a:defRPr sz="1500"/>
             </a:lvl4pPr>
             <a:lvl5pPr>
-              <a:defRPr sz="1125"/>
+              <a:defRPr sz="1500"/>
             </a:lvl5pPr>
             <a:lvl6pPr>
-              <a:defRPr sz="1125"/>
+              <a:defRPr sz="1500"/>
             </a:lvl6pPr>
             <a:lvl7pPr>
-              <a:defRPr sz="1125"/>
+              <a:defRPr sz="1500"/>
             </a:lvl7pPr>
             <a:lvl8pPr>
-              <a:defRPr sz="1125"/>
+              <a:defRPr sz="1500"/>
             </a:lvl8pPr>
             <a:lvl9pPr>
-              <a:defRPr sz="1125"/>
+              <a:defRPr sz="1500"/>
             </a:lvl9pPr>
           </a:lstStyle>
           <a:p>
@@ -2053,7 +2051,7 @@
               <a:rPr lang="en-US" smtClean="0"/>
               <a:t>Fifth level</a:t>
             </a:r>
-            <a:endParaRPr lang="de-DE"/>
+            <a:endParaRPr lang="en-US" dirty="0"/>
           </a:p>
         </p:txBody>
       </p:sp>
@@ -2069,8 +2067,8 @@
         </p:nvSpPr>
         <p:spPr>
           <a:xfrm>
-            <a:off x="472381" y="3657600"/>
-            <a:ext cx="2211883" cy="6776156"/>
+            <a:off x="472381" y="2469356"/>
+            <a:ext cx="2211884" cy="4574788"/>
           </a:xfrm>
         </p:spPr>
         <p:txBody>
@@ -2078,39 +2076,39 @@
           <a:lstStyle>
             <a:lvl1pPr marL="0" indent="0">
               <a:buNone/>
+              <a:defRPr sz="1200"/>
+            </a:lvl1pPr>
+            <a:lvl2pPr marL="342900" indent="0">
+              <a:buNone/>
+              <a:defRPr sz="1050"/>
+            </a:lvl2pPr>
+            <a:lvl3pPr marL="685800" indent="0">
+              <a:buNone/>
               <a:defRPr sz="900"/>
-            </a:lvl1pPr>
-            <a:lvl2pPr marL="257175" indent="0">
-              <a:buNone/>
-              <a:defRPr sz="788"/>
-            </a:lvl2pPr>
-            <a:lvl3pPr marL="514350" indent="0">
-              <a:buNone/>
-              <a:defRPr sz="675"/>
             </a:lvl3pPr>
-            <a:lvl4pPr marL="771525" indent="0">
-              <a:buNone/>
-              <a:defRPr sz="563"/>
+            <a:lvl4pPr marL="1028700" indent="0">
+              <a:buNone/>
+              <a:defRPr sz="750"/>
             </a:lvl4pPr>
-            <a:lvl5pPr marL="1028700" indent="0">
-              <a:buNone/>
-              <a:defRPr sz="563"/>
+            <a:lvl5pPr marL="1371600" indent="0">
+              <a:buNone/>
+              <a:defRPr sz="750"/>
             </a:lvl5pPr>
-            <a:lvl6pPr marL="1285875" indent="0">
-              <a:buNone/>
-              <a:defRPr sz="563"/>
+            <a:lvl6pPr marL="1714500" indent="0">
+              <a:buNone/>
+              <a:defRPr sz="750"/>
             </a:lvl6pPr>
-            <a:lvl7pPr marL="1543050" indent="0">
-              <a:buNone/>
-              <a:defRPr sz="563"/>
+            <a:lvl7pPr marL="2057400" indent="0">
+              <a:buNone/>
+              <a:defRPr sz="750"/>
             </a:lvl7pPr>
-            <a:lvl8pPr marL="1800225" indent="0">
-              <a:buNone/>
-              <a:defRPr sz="563"/>
+            <a:lvl8pPr marL="2400300" indent="0">
+              <a:buNone/>
+              <a:defRPr sz="750"/>
             </a:lvl8pPr>
-            <a:lvl9pPr marL="2057400" indent="0">
-              <a:buNone/>
-              <a:defRPr sz="563"/>
+            <a:lvl9pPr marL="2743200" indent="0">
+              <a:buNone/>
+              <a:defRPr sz="750"/>
             </a:lvl9pPr>
           </a:lstStyle>
           <a:p>
@@ -2190,7 +2188,7 @@
     </p:spTree>
     <p:extLst>
       <p:ext uri="{BB962C8B-B14F-4D97-AF65-F5344CB8AC3E}">
-        <p14:creationId xmlns:p14="http://schemas.microsoft.com/office/powerpoint/2010/main" val="3278966857"/>
+        <p14:creationId xmlns:p14="http://schemas.microsoft.com/office/powerpoint/2010/main" val="3144337735"/>
       </p:ext>
     </p:extLst>
   </p:cSld>
@@ -2229,15 +2227,15 @@
         </p:nvSpPr>
         <p:spPr>
           <a:xfrm>
-            <a:off x="472381" y="812800"/>
-            <a:ext cx="2211883" cy="2844800"/>
+            <a:off x="472381" y="548746"/>
+            <a:ext cx="2211884" cy="1920611"/>
           </a:xfrm>
         </p:spPr>
         <p:txBody>
           <a:bodyPr anchor="b"/>
           <a:lstStyle>
             <a:lvl1pPr>
-              <a:defRPr sz="1800"/>
+              <a:defRPr sz="2400"/>
             </a:lvl1pPr>
           </a:lstStyle>
           <a:p>
@@ -2245,7 +2243,7 @@
               <a:rPr lang="en-US" smtClean="0"/>
               <a:t>Click to edit Master title style</a:t>
             </a:r>
-            <a:endParaRPr lang="de-DE"/>
+            <a:endParaRPr lang="en-US" dirty="0"/>
           </a:p>
         </p:txBody>
       </p:sp>
@@ -2253,7 +2251,7 @@
         <p:nvSpPr>
           <p:cNvPr id="3" name="Picture Placeholder 2"/>
           <p:cNvSpPr>
-            <a:spLocks noGrp="1"/>
+            <a:spLocks noGrp="1" noChangeAspect="1"/>
           </p:cNvSpPr>
           <p:nvPr>
             <p:ph type="pic" idx="1"/>
@@ -2261,8 +2259,73 @@
         </p:nvSpPr>
         <p:spPr>
           <a:xfrm>
-            <a:off x="2915543" y="1755423"/>
-            <a:ext cx="3471863" cy="8664222"/>
+            <a:off x="2915543" y="1185140"/>
+            <a:ext cx="3471863" cy="5849479"/>
+          </a:xfrm>
+        </p:spPr>
+        <p:txBody>
+          <a:bodyPr anchor="t"/>
+          <a:lstStyle>
+            <a:lvl1pPr marL="0" indent="0">
+              <a:buNone/>
+              <a:defRPr sz="2400"/>
+            </a:lvl1pPr>
+            <a:lvl2pPr marL="342900" indent="0">
+              <a:buNone/>
+              <a:defRPr sz="2100"/>
+            </a:lvl2pPr>
+            <a:lvl3pPr marL="685800" indent="0">
+              <a:buNone/>
+              <a:defRPr sz="1800"/>
+            </a:lvl3pPr>
+            <a:lvl4pPr marL="1028700" indent="0">
+              <a:buNone/>
+              <a:defRPr sz="1500"/>
+            </a:lvl4pPr>
+            <a:lvl5pPr marL="1371600" indent="0">
+              <a:buNone/>
+              <a:defRPr sz="1500"/>
+            </a:lvl5pPr>
+            <a:lvl6pPr marL="1714500" indent="0">
+              <a:buNone/>
+              <a:defRPr sz="1500"/>
+            </a:lvl6pPr>
+            <a:lvl7pPr marL="2057400" indent="0">
+              <a:buNone/>
+              <a:defRPr sz="1500"/>
+            </a:lvl7pPr>
+            <a:lvl8pPr marL="2400300" indent="0">
+              <a:buNone/>
+              <a:defRPr sz="1500"/>
+            </a:lvl8pPr>
+            <a:lvl9pPr marL="2743200" indent="0">
+              <a:buNone/>
+              <a:defRPr sz="1500"/>
+            </a:lvl9pPr>
+          </a:lstStyle>
+          <a:p>
+            <a:r>
+              <a:rPr lang="en-US" smtClean="0"/>
+              <a:t>Click icon to add picture</a:t>
+            </a:r>
+            <a:endParaRPr lang="en-US" dirty="0"/>
+          </a:p>
+        </p:txBody>
+      </p:sp>
+      <p:sp>
+        <p:nvSpPr>
+          <p:cNvPr id="4" name="Text Placeholder 3"/>
+          <p:cNvSpPr>
+            <a:spLocks noGrp="1"/>
+          </p:cNvSpPr>
+          <p:nvPr>
+            <p:ph type="body" sz="half" idx="2"/>
+          </p:nvPr>
+        </p:nvSpPr>
+        <p:spPr>
+          <a:xfrm>
+            <a:off x="472381" y="2469356"/>
+            <a:ext cx="2211884" cy="4574788"/>
           </a:xfrm>
         </p:spPr>
         <p:txBody>
@@ -2270,100 +2333,39 @@
           <a:lstStyle>
             <a:lvl1pPr marL="0" indent="0">
               <a:buNone/>
-              <a:defRPr sz="1800"/>
+              <a:defRPr sz="1200"/>
             </a:lvl1pPr>
-            <a:lvl2pPr marL="257175" indent="0">
-              <a:buNone/>
-              <a:defRPr sz="1575"/>
+            <a:lvl2pPr marL="342900" indent="0">
+              <a:buNone/>
+              <a:defRPr sz="1050"/>
             </a:lvl2pPr>
-            <a:lvl3pPr marL="514350" indent="0">
-              <a:buNone/>
-              <a:defRPr sz="1350"/>
+            <a:lvl3pPr marL="685800" indent="0">
+              <a:buNone/>
+              <a:defRPr sz="900"/>
             </a:lvl3pPr>
-            <a:lvl4pPr marL="771525" indent="0">
-              <a:buNone/>
-              <a:defRPr sz="1125"/>
+            <a:lvl4pPr marL="1028700" indent="0">
+              <a:buNone/>
+              <a:defRPr sz="750"/>
             </a:lvl4pPr>
-            <a:lvl5pPr marL="1028700" indent="0">
-              <a:buNone/>
-              <a:defRPr sz="1125"/>
+            <a:lvl5pPr marL="1371600" indent="0">
+              <a:buNone/>
+              <a:defRPr sz="750"/>
             </a:lvl5pPr>
-            <a:lvl6pPr marL="1285875" indent="0">
-              <a:buNone/>
-              <a:defRPr sz="1125"/>
+            <a:lvl6pPr marL="1714500" indent="0">
+              <a:buNone/>
+              <a:defRPr sz="750"/>
             </a:lvl6pPr>
-            <a:lvl7pPr marL="1543050" indent="0">
-              <a:buNone/>
-              <a:defRPr sz="1125"/>
+            <a:lvl7pPr marL="2057400" indent="0">
+              <a:buNone/>
+              <a:defRPr sz="750"/>
             </a:lvl7pPr>
-            <a:lvl8pPr marL="1800225" indent="0">
-              <a:buNone/>
-              <a:defRPr sz="1125"/>
+            <a:lvl8pPr marL="2400300" indent="0">
+              <a:buNone/>
+              <a:defRPr sz="750"/>
             </a:lvl8pPr>
-            <a:lvl9pPr marL="2057400" indent="0">
-              <a:buNone/>
-              <a:defRPr sz="1125"/>
-            </a:lvl9pPr>
-          </a:lstStyle>
-          <a:p>
-            <a:endParaRPr lang="de-DE"/>
-          </a:p>
-        </p:txBody>
-      </p:sp>
-      <p:sp>
-        <p:nvSpPr>
-          <p:cNvPr id="4" name="Text Placeholder 3"/>
-          <p:cNvSpPr>
-            <a:spLocks noGrp="1"/>
-          </p:cNvSpPr>
-          <p:nvPr>
-            <p:ph type="body" sz="half" idx="2"/>
-          </p:nvPr>
-        </p:nvSpPr>
-        <p:spPr>
-          <a:xfrm>
-            <a:off x="472381" y="3657600"/>
-            <a:ext cx="2211883" cy="6776156"/>
-          </a:xfrm>
-        </p:spPr>
-        <p:txBody>
-          <a:bodyPr/>
-          <a:lstStyle>
-            <a:lvl1pPr marL="0" indent="0">
-              <a:buNone/>
-              <a:defRPr sz="900"/>
-            </a:lvl1pPr>
-            <a:lvl2pPr marL="257175" indent="0">
-              <a:buNone/>
-              <a:defRPr sz="788"/>
-            </a:lvl2pPr>
-            <a:lvl3pPr marL="514350" indent="0">
-              <a:buNone/>
-              <a:defRPr sz="675"/>
-            </a:lvl3pPr>
-            <a:lvl4pPr marL="771525" indent="0">
-              <a:buNone/>
-              <a:defRPr sz="563"/>
-            </a:lvl4pPr>
-            <a:lvl5pPr marL="1028700" indent="0">
-              <a:buNone/>
-              <a:defRPr sz="563"/>
-            </a:lvl5pPr>
-            <a:lvl6pPr marL="1285875" indent="0">
-              <a:buNone/>
-              <a:defRPr sz="563"/>
-            </a:lvl6pPr>
-            <a:lvl7pPr marL="1543050" indent="0">
-              <a:buNone/>
-              <a:defRPr sz="563"/>
-            </a:lvl7pPr>
-            <a:lvl8pPr marL="1800225" indent="0">
-              <a:buNone/>
-              <a:defRPr sz="563"/>
-            </a:lvl8pPr>
-            <a:lvl9pPr marL="2057400" indent="0">
-              <a:buNone/>
-              <a:defRPr sz="563"/>
+            <a:lvl9pPr marL="2743200" indent="0">
+              <a:buNone/>
+              <a:defRPr sz="750"/>
             </a:lvl9pPr>
           </a:lstStyle>
           <a:p>
@@ -2443,7 +2445,7 @@
     </p:spTree>
     <p:extLst>
       <p:ext uri="{BB962C8B-B14F-4D97-AF65-F5344CB8AC3E}">
-        <p14:creationId xmlns:p14="http://schemas.microsoft.com/office/powerpoint/2010/main" val="119213719"/>
+        <p14:creationId xmlns:p14="http://schemas.microsoft.com/office/powerpoint/2010/main" val="831982244"/>
       </p:ext>
     </p:extLst>
   </p:cSld>
@@ -2487,8 +2489,8 @@
         </p:nvSpPr>
         <p:spPr>
           <a:xfrm>
-            <a:off x="471488" y="649112"/>
-            <a:ext cx="5915025" cy="2356556"/>
+            <a:off x="471488" y="438236"/>
+            <a:ext cx="5915025" cy="1590983"/>
           </a:xfrm>
           <a:prstGeom prst="rect">
             <a:avLst/>
@@ -2504,7 +2506,7 @@
               <a:rPr lang="en-US" smtClean="0"/>
               <a:t>Click to edit Master title style</a:t>
             </a:r>
-            <a:endParaRPr lang="de-DE"/>
+            <a:endParaRPr lang="en-US" dirty="0"/>
           </a:p>
         </p:txBody>
       </p:sp>
@@ -2520,8 +2522,8 @@
         </p:nvSpPr>
         <p:spPr>
           <a:xfrm>
-            <a:off x="471488" y="3245556"/>
-            <a:ext cx="5915025" cy="7735712"/>
+            <a:off x="471488" y="2191173"/>
+            <a:ext cx="5915025" cy="5222613"/>
           </a:xfrm>
           <a:prstGeom prst="rect">
             <a:avLst/>
@@ -2566,7 +2568,7 @@
               <a:rPr lang="en-US" smtClean="0"/>
               <a:t>Fifth level</a:t>
             </a:r>
-            <a:endParaRPr lang="de-DE"/>
+            <a:endParaRPr lang="en-US" dirty="0"/>
           </a:p>
         </p:txBody>
       </p:sp>
@@ -2582,8 +2584,8 @@
         </p:nvSpPr>
         <p:spPr>
           <a:xfrm>
-            <a:off x="471488" y="11300179"/>
-            <a:ext cx="1543050" cy="649111"/>
+            <a:off x="471488" y="7629093"/>
+            <a:ext cx="1543050" cy="438235"/>
           </a:xfrm>
           <a:prstGeom prst="rect">
             <a:avLst/>
@@ -2593,7 +2595,7 @@
           <a:bodyPr vert="horz" lIns="91440" tIns="45720" rIns="91440" bIns="45720" rtlCol="0" anchor="ctr"/>
           <a:lstStyle>
             <a:lvl1pPr algn="l">
-              <a:defRPr sz="675">
+              <a:defRPr sz="900">
                 <a:solidFill>
                   <a:schemeClr val="tx1">
                     <a:tint val="75000"/>
@@ -2623,8 +2625,8 @@
         </p:nvSpPr>
         <p:spPr>
           <a:xfrm>
-            <a:off x="2271713" y="11300179"/>
-            <a:ext cx="2314575" cy="649111"/>
+            <a:off x="2271713" y="7629093"/>
+            <a:ext cx="2314575" cy="438235"/>
           </a:xfrm>
           <a:prstGeom prst="rect">
             <a:avLst/>
@@ -2634,7 +2636,7 @@
           <a:bodyPr vert="horz" lIns="91440" tIns="45720" rIns="91440" bIns="45720" rtlCol="0" anchor="ctr"/>
           <a:lstStyle>
             <a:lvl1pPr algn="ctr">
-              <a:defRPr sz="675">
+              <a:defRPr sz="900">
                 <a:solidFill>
                   <a:schemeClr val="tx1">
                     <a:tint val="75000"/>
@@ -2660,8 +2662,8 @@
         </p:nvSpPr>
         <p:spPr>
           <a:xfrm>
-            <a:off x="4843463" y="11300179"/>
-            <a:ext cx="1543050" cy="649111"/>
+            <a:off x="4843463" y="7629093"/>
+            <a:ext cx="1543050" cy="438235"/>
           </a:xfrm>
           <a:prstGeom prst="rect">
             <a:avLst/>
@@ -2671,7 +2673,7 @@
           <a:bodyPr vert="horz" lIns="91440" tIns="45720" rIns="91440" bIns="45720" rtlCol="0" anchor="ctr"/>
           <a:lstStyle>
             <a:lvl1pPr algn="r">
-              <a:defRPr sz="675">
+              <a:defRPr sz="900">
                 <a:solidFill>
                   <a:schemeClr val="tx1">
                     <a:tint val="75000"/>
@@ -2692,27 +2694,27 @@
     </p:spTree>
     <p:extLst>
       <p:ext uri="{BB962C8B-B14F-4D97-AF65-F5344CB8AC3E}">
-        <p14:creationId xmlns:p14="http://schemas.microsoft.com/office/powerpoint/2010/main" val="2968487442"/>
+        <p14:creationId xmlns:p14="http://schemas.microsoft.com/office/powerpoint/2010/main" val="1242647248"/>
       </p:ext>
     </p:extLst>
   </p:cSld>
   <p:clrMap bg1="lt1" tx1="dk1" bg2="lt2" tx2="dk2" accent1="accent1" accent2="accent2" accent3="accent3" accent4="accent4" accent5="accent5" accent6="accent6" hlink="hlink" folHlink="folHlink"/>
   <p:sldLayoutIdLst>
-    <p:sldLayoutId id="2147483649" r:id="rId1"/>
-    <p:sldLayoutId id="2147483650" r:id="rId2"/>
-    <p:sldLayoutId id="2147483651" r:id="rId3"/>
-    <p:sldLayoutId id="2147483652" r:id="rId4"/>
-    <p:sldLayoutId id="2147483653" r:id="rId5"/>
-    <p:sldLayoutId id="2147483654" r:id="rId6"/>
-    <p:sldLayoutId id="2147483655" r:id="rId7"/>
-    <p:sldLayoutId id="2147483656" r:id="rId8"/>
-    <p:sldLayoutId id="2147483657" r:id="rId9"/>
-    <p:sldLayoutId id="2147483658" r:id="rId10"/>
-    <p:sldLayoutId id="2147483659" r:id="rId11"/>
+    <p:sldLayoutId id="2147483673" r:id="rId1"/>
+    <p:sldLayoutId id="2147483674" r:id="rId2"/>
+    <p:sldLayoutId id="2147483675" r:id="rId3"/>
+    <p:sldLayoutId id="2147483676" r:id="rId4"/>
+    <p:sldLayoutId id="2147483677" r:id="rId5"/>
+    <p:sldLayoutId id="2147483678" r:id="rId6"/>
+    <p:sldLayoutId id="2147483679" r:id="rId7"/>
+    <p:sldLayoutId id="2147483680" r:id="rId8"/>
+    <p:sldLayoutId id="2147483681" r:id="rId9"/>
+    <p:sldLayoutId id="2147483682" r:id="rId10"/>
+    <p:sldLayoutId id="2147483683" r:id="rId11"/>
   </p:sldLayoutIdLst>
   <p:txStyles>
     <p:titleStyle>
-      <a:lvl1pPr algn="l" defTabSz="514350" rtl="0" eaLnBrk="1" latinLnBrk="0" hangingPunct="1">
+      <a:lvl1pPr algn="l" defTabSz="685800" rtl="0" eaLnBrk="1" latinLnBrk="0" hangingPunct="1">
         <a:lnSpc>
           <a:spcPct val="90000"/>
         </a:lnSpc>
@@ -2720,7 +2722,7 @@
           <a:spcPct val="0"/>
         </a:spcBef>
         <a:buNone/>
-        <a:defRPr sz="2475" kern="1200">
+        <a:defRPr sz="3300" kern="1200">
           <a:solidFill>
             <a:schemeClr val="tx1"/>
           </a:solidFill>
@@ -2731,16 +2733,16 @@
       </a:lvl1pPr>
     </p:titleStyle>
     <p:bodyStyle>
-      <a:lvl1pPr marL="128588" indent="-128588" algn="l" defTabSz="514350" rtl="0" eaLnBrk="1" latinLnBrk="0" hangingPunct="1">
+      <a:lvl1pPr marL="171450" indent="-171450" algn="l" defTabSz="685800" rtl="0" eaLnBrk="1" latinLnBrk="0" hangingPunct="1">
         <a:lnSpc>
           <a:spcPct val="90000"/>
         </a:lnSpc>
         <a:spcBef>
-          <a:spcPts val="563"/>
+          <a:spcPts val="750"/>
         </a:spcBef>
         <a:buFont typeface="Arial" panose="020B0604020202020204" pitchFamily="34" charset="0"/>
         <a:buChar char="•"/>
-        <a:defRPr sz="1575" kern="1200">
+        <a:defRPr sz="2100" kern="1200">
           <a:solidFill>
             <a:schemeClr val="tx1"/>
           </a:solidFill>
@@ -2749,12 +2751,48 @@
           <a:cs typeface="+mn-cs"/>
         </a:defRPr>
       </a:lvl1pPr>
-      <a:lvl2pPr marL="385763" indent="-128588" algn="l" defTabSz="514350" rtl="0" eaLnBrk="1" latinLnBrk="0" hangingPunct="1">
+      <a:lvl2pPr marL="514350" indent="-171450" algn="l" defTabSz="685800" rtl="0" eaLnBrk="1" latinLnBrk="0" hangingPunct="1">
         <a:lnSpc>
           <a:spcPct val="90000"/>
         </a:lnSpc>
         <a:spcBef>
-          <a:spcPts val="281"/>
+          <a:spcPts val="375"/>
+        </a:spcBef>
+        <a:buFont typeface="Arial" panose="020B0604020202020204" pitchFamily="34" charset="0"/>
+        <a:buChar char="•"/>
+        <a:defRPr sz="1800" kern="1200">
+          <a:solidFill>
+            <a:schemeClr val="tx1"/>
+          </a:solidFill>
+          <a:latin typeface="+mn-lt"/>
+          <a:ea typeface="+mn-ea"/>
+          <a:cs typeface="+mn-cs"/>
+        </a:defRPr>
+      </a:lvl2pPr>
+      <a:lvl3pPr marL="857250" indent="-171450" algn="l" defTabSz="685800" rtl="0" eaLnBrk="1" latinLnBrk="0" hangingPunct="1">
+        <a:lnSpc>
+          <a:spcPct val="90000"/>
+        </a:lnSpc>
+        <a:spcBef>
+          <a:spcPts val="375"/>
+        </a:spcBef>
+        <a:buFont typeface="Arial" panose="020B0604020202020204" pitchFamily="34" charset="0"/>
+        <a:buChar char="•"/>
+        <a:defRPr sz="1500" kern="1200">
+          <a:solidFill>
+            <a:schemeClr val="tx1"/>
+          </a:solidFill>
+          <a:latin typeface="+mn-lt"/>
+          <a:ea typeface="+mn-ea"/>
+          <a:cs typeface="+mn-cs"/>
+        </a:defRPr>
+      </a:lvl3pPr>
+      <a:lvl4pPr marL="1200150" indent="-171450" algn="l" defTabSz="685800" rtl="0" eaLnBrk="1" latinLnBrk="0" hangingPunct="1">
+        <a:lnSpc>
+          <a:spcPct val="90000"/>
+        </a:lnSpc>
+        <a:spcBef>
+          <a:spcPts val="375"/>
         </a:spcBef>
         <a:buFont typeface="Arial" panose="020B0604020202020204" pitchFamily="34" charset="0"/>
         <a:buChar char="•"/>
@@ -2766,53 +2804,17 @@
           <a:ea typeface="+mn-ea"/>
           <a:cs typeface="+mn-cs"/>
         </a:defRPr>
-      </a:lvl2pPr>
-      <a:lvl3pPr marL="642938" indent="-128588" algn="l" defTabSz="514350" rtl="0" eaLnBrk="1" latinLnBrk="0" hangingPunct="1">
+      </a:lvl4pPr>
+      <a:lvl5pPr marL="1543050" indent="-171450" algn="l" defTabSz="685800" rtl="0" eaLnBrk="1" latinLnBrk="0" hangingPunct="1">
         <a:lnSpc>
           <a:spcPct val="90000"/>
         </a:lnSpc>
         <a:spcBef>
-          <a:spcPts val="281"/>
+          <a:spcPts val="375"/>
         </a:spcBef>
         <a:buFont typeface="Arial" panose="020B0604020202020204" pitchFamily="34" charset="0"/>
         <a:buChar char="•"/>
-        <a:defRPr sz="1125" kern="1200">
-          <a:solidFill>
-            <a:schemeClr val="tx1"/>
-          </a:solidFill>
-          <a:latin typeface="+mn-lt"/>
-          <a:ea typeface="+mn-ea"/>
-          <a:cs typeface="+mn-cs"/>
-        </a:defRPr>
-      </a:lvl3pPr>
-      <a:lvl4pPr marL="900113" indent="-128588" algn="l" defTabSz="514350" rtl="0" eaLnBrk="1" latinLnBrk="0" hangingPunct="1">
-        <a:lnSpc>
-          <a:spcPct val="90000"/>
-        </a:lnSpc>
-        <a:spcBef>
-          <a:spcPts val="281"/>
-        </a:spcBef>
-        <a:buFont typeface="Arial" panose="020B0604020202020204" pitchFamily="34" charset="0"/>
-        <a:buChar char="•"/>
-        <a:defRPr sz="1013" kern="1200">
-          <a:solidFill>
-            <a:schemeClr val="tx1"/>
-          </a:solidFill>
-          <a:latin typeface="+mn-lt"/>
-          <a:ea typeface="+mn-ea"/>
-          <a:cs typeface="+mn-cs"/>
-        </a:defRPr>
-      </a:lvl4pPr>
-      <a:lvl5pPr marL="1157288" indent="-128588" algn="l" defTabSz="514350" rtl="0" eaLnBrk="1" latinLnBrk="0" hangingPunct="1">
-        <a:lnSpc>
-          <a:spcPct val="90000"/>
-        </a:lnSpc>
-        <a:spcBef>
-          <a:spcPts val="281"/>
-        </a:spcBef>
-        <a:buFont typeface="Arial" panose="020B0604020202020204" pitchFamily="34" charset="0"/>
-        <a:buChar char="•"/>
-        <a:defRPr sz="1013" kern="1200">
+        <a:defRPr sz="1350" kern="1200">
           <a:solidFill>
             <a:schemeClr val="tx1"/>
           </a:solidFill>
@@ -2821,16 +2823,16 @@
           <a:cs typeface="+mn-cs"/>
         </a:defRPr>
       </a:lvl5pPr>
-      <a:lvl6pPr marL="1414463" indent="-128588" algn="l" defTabSz="514350" rtl="0" eaLnBrk="1" latinLnBrk="0" hangingPunct="1">
+      <a:lvl6pPr marL="1885950" indent="-171450" algn="l" defTabSz="685800" rtl="0" eaLnBrk="1" latinLnBrk="0" hangingPunct="1">
         <a:lnSpc>
           <a:spcPct val="90000"/>
         </a:lnSpc>
         <a:spcBef>
-          <a:spcPts val="281"/>
+          <a:spcPts val="375"/>
         </a:spcBef>
         <a:buFont typeface="Arial" panose="020B0604020202020204" pitchFamily="34" charset="0"/>
         <a:buChar char="•"/>
-        <a:defRPr sz="1013" kern="1200">
+        <a:defRPr sz="1350" kern="1200">
           <a:solidFill>
             <a:schemeClr val="tx1"/>
           </a:solidFill>
@@ -2839,16 +2841,16 @@
           <a:cs typeface="+mn-cs"/>
         </a:defRPr>
       </a:lvl6pPr>
-      <a:lvl7pPr marL="1671638" indent="-128588" algn="l" defTabSz="514350" rtl="0" eaLnBrk="1" latinLnBrk="0" hangingPunct="1">
+      <a:lvl7pPr marL="2228850" indent="-171450" algn="l" defTabSz="685800" rtl="0" eaLnBrk="1" latinLnBrk="0" hangingPunct="1">
         <a:lnSpc>
           <a:spcPct val="90000"/>
         </a:lnSpc>
         <a:spcBef>
-          <a:spcPts val="281"/>
+          <a:spcPts val="375"/>
         </a:spcBef>
         <a:buFont typeface="Arial" panose="020B0604020202020204" pitchFamily="34" charset="0"/>
         <a:buChar char="•"/>
-        <a:defRPr sz="1013" kern="1200">
+        <a:defRPr sz="1350" kern="1200">
           <a:solidFill>
             <a:schemeClr val="tx1"/>
           </a:solidFill>
@@ -2857,16 +2859,16 @@
           <a:cs typeface="+mn-cs"/>
         </a:defRPr>
       </a:lvl7pPr>
-      <a:lvl8pPr marL="1928813" indent="-128588" algn="l" defTabSz="514350" rtl="0" eaLnBrk="1" latinLnBrk="0" hangingPunct="1">
+      <a:lvl8pPr marL="2571750" indent="-171450" algn="l" defTabSz="685800" rtl="0" eaLnBrk="1" latinLnBrk="0" hangingPunct="1">
         <a:lnSpc>
           <a:spcPct val="90000"/>
         </a:lnSpc>
         <a:spcBef>
-          <a:spcPts val="281"/>
+          <a:spcPts val="375"/>
         </a:spcBef>
         <a:buFont typeface="Arial" panose="020B0604020202020204" pitchFamily="34" charset="0"/>
         <a:buChar char="•"/>
-        <a:defRPr sz="1013" kern="1200">
+        <a:defRPr sz="1350" kern="1200">
           <a:solidFill>
             <a:schemeClr val="tx1"/>
           </a:solidFill>
@@ -2875,16 +2877,16 @@
           <a:cs typeface="+mn-cs"/>
         </a:defRPr>
       </a:lvl8pPr>
-      <a:lvl9pPr marL="2185988" indent="-128588" algn="l" defTabSz="514350" rtl="0" eaLnBrk="1" latinLnBrk="0" hangingPunct="1">
+      <a:lvl9pPr marL="2914650" indent="-171450" algn="l" defTabSz="685800" rtl="0" eaLnBrk="1" latinLnBrk="0" hangingPunct="1">
         <a:lnSpc>
           <a:spcPct val="90000"/>
         </a:lnSpc>
         <a:spcBef>
-          <a:spcPts val="281"/>
+          <a:spcPts val="375"/>
         </a:spcBef>
         <a:buFont typeface="Arial" panose="020B0604020202020204" pitchFamily="34" charset="0"/>
         <a:buChar char="•"/>
-        <a:defRPr sz="1013" kern="1200">
+        <a:defRPr sz="1350" kern="1200">
           <a:solidFill>
             <a:schemeClr val="tx1"/>
           </a:solidFill>
@@ -2896,10 +2898,10 @@
     </p:bodyStyle>
     <p:otherStyle>
       <a:defPPr>
-        <a:defRPr lang="de-DE"/>
+        <a:defRPr lang="en-US"/>
       </a:defPPr>
-      <a:lvl1pPr marL="0" algn="l" defTabSz="514350" rtl="0" eaLnBrk="1" latinLnBrk="0" hangingPunct="1">
-        <a:defRPr sz="1013" kern="1200">
+      <a:lvl1pPr marL="0" algn="l" defTabSz="685800" rtl="0" eaLnBrk="1" latinLnBrk="0" hangingPunct="1">
+        <a:defRPr sz="1350" kern="1200">
           <a:solidFill>
             <a:schemeClr val="tx1"/>
           </a:solidFill>
@@ -2908,8 +2910,8 @@
           <a:cs typeface="+mn-cs"/>
         </a:defRPr>
       </a:lvl1pPr>
-      <a:lvl2pPr marL="257175" algn="l" defTabSz="514350" rtl="0" eaLnBrk="1" latinLnBrk="0" hangingPunct="1">
-        <a:defRPr sz="1013" kern="1200">
+      <a:lvl2pPr marL="342900" algn="l" defTabSz="685800" rtl="0" eaLnBrk="1" latinLnBrk="0" hangingPunct="1">
+        <a:defRPr sz="1350" kern="1200">
           <a:solidFill>
             <a:schemeClr val="tx1"/>
           </a:solidFill>
@@ -2918,8 +2920,8 @@
           <a:cs typeface="+mn-cs"/>
         </a:defRPr>
       </a:lvl2pPr>
-      <a:lvl3pPr marL="514350" algn="l" defTabSz="514350" rtl="0" eaLnBrk="1" latinLnBrk="0" hangingPunct="1">
-        <a:defRPr sz="1013" kern="1200">
+      <a:lvl3pPr marL="685800" algn="l" defTabSz="685800" rtl="0" eaLnBrk="1" latinLnBrk="0" hangingPunct="1">
+        <a:defRPr sz="1350" kern="1200">
           <a:solidFill>
             <a:schemeClr val="tx1"/>
           </a:solidFill>
@@ -2928,8 +2930,8 @@
           <a:cs typeface="+mn-cs"/>
         </a:defRPr>
       </a:lvl3pPr>
-      <a:lvl4pPr marL="771525" algn="l" defTabSz="514350" rtl="0" eaLnBrk="1" latinLnBrk="0" hangingPunct="1">
-        <a:defRPr sz="1013" kern="1200">
+      <a:lvl4pPr marL="1028700" algn="l" defTabSz="685800" rtl="0" eaLnBrk="1" latinLnBrk="0" hangingPunct="1">
+        <a:defRPr sz="1350" kern="1200">
           <a:solidFill>
             <a:schemeClr val="tx1"/>
           </a:solidFill>
@@ -2938,8 +2940,8 @@
           <a:cs typeface="+mn-cs"/>
         </a:defRPr>
       </a:lvl4pPr>
-      <a:lvl5pPr marL="1028700" algn="l" defTabSz="514350" rtl="0" eaLnBrk="1" latinLnBrk="0" hangingPunct="1">
-        <a:defRPr sz="1013" kern="1200">
+      <a:lvl5pPr marL="1371600" algn="l" defTabSz="685800" rtl="0" eaLnBrk="1" latinLnBrk="0" hangingPunct="1">
+        <a:defRPr sz="1350" kern="1200">
           <a:solidFill>
             <a:schemeClr val="tx1"/>
           </a:solidFill>
@@ -2948,8 +2950,8 @@
           <a:cs typeface="+mn-cs"/>
         </a:defRPr>
       </a:lvl5pPr>
-      <a:lvl6pPr marL="1285875" algn="l" defTabSz="514350" rtl="0" eaLnBrk="1" latinLnBrk="0" hangingPunct="1">
-        <a:defRPr sz="1013" kern="1200">
+      <a:lvl6pPr marL="1714500" algn="l" defTabSz="685800" rtl="0" eaLnBrk="1" latinLnBrk="0" hangingPunct="1">
+        <a:defRPr sz="1350" kern="1200">
           <a:solidFill>
             <a:schemeClr val="tx1"/>
           </a:solidFill>
@@ -2958,8 +2960,8 @@
           <a:cs typeface="+mn-cs"/>
         </a:defRPr>
       </a:lvl6pPr>
-      <a:lvl7pPr marL="1543050" algn="l" defTabSz="514350" rtl="0" eaLnBrk="1" latinLnBrk="0" hangingPunct="1">
-        <a:defRPr sz="1013" kern="1200">
+      <a:lvl7pPr marL="2057400" algn="l" defTabSz="685800" rtl="0" eaLnBrk="1" latinLnBrk="0" hangingPunct="1">
+        <a:defRPr sz="1350" kern="1200">
           <a:solidFill>
             <a:schemeClr val="tx1"/>
           </a:solidFill>
@@ -2968,8 +2970,8 @@
           <a:cs typeface="+mn-cs"/>
         </a:defRPr>
       </a:lvl7pPr>
-      <a:lvl8pPr marL="1800225" algn="l" defTabSz="514350" rtl="0" eaLnBrk="1" latinLnBrk="0" hangingPunct="1">
-        <a:defRPr sz="1013" kern="1200">
+      <a:lvl8pPr marL="2400300" algn="l" defTabSz="685800" rtl="0" eaLnBrk="1" latinLnBrk="0" hangingPunct="1">
+        <a:defRPr sz="1350" kern="1200">
           <a:solidFill>
             <a:schemeClr val="tx1"/>
           </a:solidFill>
@@ -2978,8 +2980,8 @@
           <a:cs typeface="+mn-cs"/>
         </a:defRPr>
       </a:lvl8pPr>
-      <a:lvl9pPr marL="2057400" algn="l" defTabSz="514350" rtl="0" eaLnBrk="1" latinLnBrk="0" hangingPunct="1">
-        <a:defRPr sz="1013" kern="1200">
+      <a:lvl9pPr marL="2743200" algn="l" defTabSz="685800" rtl="0" eaLnBrk="1" latinLnBrk="0" hangingPunct="1">
+        <a:defRPr sz="1350" kern="1200">
           <a:solidFill>
             <a:schemeClr val="tx1"/>
           </a:solidFill>
@@ -3018,10 +3020,10 @@
         </p:nvGrpSpPr>
         <p:grpSpPr>
           <a:xfrm>
-            <a:off x="50800" y="12351"/>
-            <a:ext cx="6807200" cy="7929424"/>
+            <a:off x="1148275" y="8339"/>
+            <a:ext cx="4595746" cy="5290489"/>
             <a:chOff x="50800" y="0"/>
-            <a:chExt cx="6807200" cy="7929424"/>
+            <a:chExt cx="6807200" cy="7836250"/>
           </a:xfrm>
         </p:grpSpPr>
         <p:pic>
@@ -3098,13 +3100,13 @@
                 </a:ext>
               </a:extLst>
             </a:blip>
-            <a:srcRect l="880" r="-1"/>
+            <a:srcRect l="880" r="-1" b="3557"/>
             <a:stretch/>
           </p:blipFill>
           <p:spPr>
             <a:xfrm>
-              <a:off x="57150" y="5310325"/>
-              <a:ext cx="6797674" cy="2619099"/>
+              <a:off x="57150" y="5310326"/>
+              <a:ext cx="6797674" cy="2525924"/>
             </a:xfrm>
             <a:prstGeom prst="rect">
               <a:avLst/>
@@ -3120,8 +3122,8 @@
         </p:nvSpPr>
         <p:spPr>
           <a:xfrm>
-            <a:off x="1905000" y="3977063"/>
-            <a:ext cx="281940" cy="273062"/>
+            <a:off x="2400102" y="2685035"/>
+            <a:ext cx="190346" cy="184353"/>
           </a:xfrm>
           <a:prstGeom prst="ellipse">
             <a:avLst/>
@@ -3155,7 +3157,7 @@
           <a:p>
             <a:pPr algn="ctr"/>
             <a:r>
-              <a:rPr lang="de-DE" sz="1600" b="1" dirty="0" smtClean="0">
+              <a:rPr lang="de-DE" sz="1080" b="1" dirty="0">
                 <a:solidFill>
                   <a:srgbClr val="3D96FF"/>
                 </a:solidFill>
@@ -3163,7 +3165,7 @@
               </a:rPr>
               <a:t>1</a:t>
             </a:r>
-            <a:endParaRPr lang="de-DE" sz="1100" b="1" dirty="0">
+            <a:endParaRPr lang="de-DE" sz="743" b="1" dirty="0">
               <a:solidFill>
                 <a:srgbClr val="3D96FF"/>
               </a:solidFill>
@@ -3180,8 +3182,8 @@
         </p:nvSpPr>
         <p:spPr>
           <a:xfrm>
-            <a:off x="1905000" y="4471862"/>
-            <a:ext cx="281940" cy="273062"/>
+            <a:off x="2400102" y="3019089"/>
+            <a:ext cx="190346" cy="184353"/>
           </a:xfrm>
           <a:prstGeom prst="ellipse">
             <a:avLst/>
@@ -3215,7 +3217,7 @@
           <a:p>
             <a:pPr algn="ctr"/>
             <a:r>
-              <a:rPr lang="de-DE" sz="1600" b="1" dirty="0">
+              <a:rPr lang="de-DE" sz="1080" b="1" dirty="0">
                 <a:solidFill>
                   <a:srgbClr val="3D96FF"/>
                 </a:solidFill>
@@ -3223,7 +3225,7 @@
               </a:rPr>
               <a:t>2</a:t>
             </a:r>
-            <a:endParaRPr lang="de-DE" sz="1100" b="1" dirty="0">
+            <a:endParaRPr lang="de-DE" sz="743" b="1" dirty="0">
               <a:solidFill>
                 <a:srgbClr val="3D96FF"/>
               </a:solidFill>
@@ -3240,8 +3242,8 @@
         </p:nvSpPr>
         <p:spPr>
           <a:xfrm>
-            <a:off x="1905000" y="5613867"/>
-            <a:ext cx="281940" cy="273062"/>
+            <a:off x="2400102" y="3790091"/>
+            <a:ext cx="190346" cy="184353"/>
           </a:xfrm>
           <a:prstGeom prst="ellipse">
             <a:avLst/>
@@ -3275,7 +3277,7 @@
           <a:p>
             <a:pPr algn="ctr"/>
             <a:r>
-              <a:rPr lang="de-DE" sz="1600" b="1" dirty="0" smtClean="0">
+              <a:rPr lang="de-DE" sz="1080" b="1" dirty="0">
                 <a:solidFill>
                   <a:srgbClr val="3D96FF"/>
                 </a:solidFill>
@@ -3283,7 +3285,7 @@
               </a:rPr>
               <a:t>3</a:t>
             </a:r>
-            <a:endParaRPr lang="de-DE" sz="1100" b="1" dirty="0">
+            <a:endParaRPr lang="de-DE" sz="743" b="1" dirty="0">
               <a:solidFill>
                 <a:srgbClr val="3D96FF"/>
               </a:solidFill>
@@ -3300,8 +3302,8 @@
         </p:nvSpPr>
         <p:spPr>
           <a:xfrm>
-            <a:off x="1394460" y="6269187"/>
-            <a:ext cx="281940" cy="273062"/>
+            <a:off x="2055420" y="4232518"/>
+            <a:ext cx="190346" cy="184353"/>
           </a:xfrm>
           <a:prstGeom prst="ellipse">
             <a:avLst/>
@@ -3335,7 +3337,7 @@
           <a:p>
             <a:pPr algn="ctr"/>
             <a:r>
-              <a:rPr lang="de-DE" sz="1600" b="1" dirty="0">
+              <a:rPr lang="de-DE" sz="1080" b="1" dirty="0">
                 <a:solidFill>
                   <a:srgbClr val="3D96FF"/>
                 </a:solidFill>
@@ -3343,7 +3345,7 @@
               </a:rPr>
               <a:t>4</a:t>
             </a:r>
-            <a:endParaRPr lang="de-DE" sz="1100" b="1" dirty="0">
+            <a:endParaRPr lang="de-DE" sz="743" b="1" dirty="0">
               <a:solidFill>
                 <a:srgbClr val="3D96FF"/>
               </a:solidFill>
@@ -3360,8 +3362,8 @@
         </p:nvSpPr>
         <p:spPr>
           <a:xfrm>
-            <a:off x="4366260" y="878334"/>
-            <a:ext cx="281940" cy="273062"/>
+            <a:off x="4061773" y="592990"/>
+            <a:ext cx="190346" cy="184353"/>
           </a:xfrm>
           <a:prstGeom prst="ellipse">
             <a:avLst/>
@@ -3395,7 +3397,7 @@
           <a:p>
             <a:pPr algn="ctr"/>
             <a:r>
-              <a:rPr lang="de-DE" sz="1600" b="1" dirty="0">
+              <a:rPr lang="de-DE" sz="1080" b="1" dirty="0">
                 <a:solidFill>
                   <a:srgbClr val="3D96FF"/>
                 </a:solidFill>
@@ -3403,7 +3405,7 @@
               </a:rPr>
               <a:t>5</a:t>
             </a:r>
-            <a:endParaRPr lang="de-DE" sz="1100" b="1" dirty="0">
+            <a:endParaRPr lang="de-DE" sz="743" b="1" dirty="0">
               <a:solidFill>
                 <a:srgbClr val="3D96FF"/>
               </a:solidFill>
@@ -3420,8 +3422,8 @@
         </p:nvSpPr>
         <p:spPr>
           <a:xfrm>
-            <a:off x="5600700" y="3977063"/>
-            <a:ext cx="281940" cy="273062"/>
+            <a:off x="4895181" y="2685035"/>
+            <a:ext cx="190346" cy="184353"/>
           </a:xfrm>
           <a:prstGeom prst="ellipse">
             <a:avLst/>
@@ -3455,7 +3457,7 @@
           <a:p>
             <a:pPr algn="ctr"/>
             <a:r>
-              <a:rPr lang="de-DE" sz="1600" b="1" dirty="0" smtClean="0">
+              <a:rPr lang="de-DE" sz="1080" b="1" dirty="0">
                 <a:solidFill>
                   <a:srgbClr val="3D96FF"/>
                 </a:solidFill>
@@ -3463,7 +3465,7 @@
               </a:rPr>
               <a:t>6</a:t>
             </a:r>
-            <a:endParaRPr lang="de-DE" sz="1100" b="1" dirty="0">
+            <a:endParaRPr lang="de-DE" sz="743" b="1" dirty="0">
               <a:solidFill>
                 <a:srgbClr val="3D96FF"/>
               </a:solidFill>
@@ -3480,8 +3482,8 @@
         </p:nvSpPr>
         <p:spPr>
           <a:xfrm>
-            <a:off x="2186940" y="6986584"/>
-            <a:ext cx="281940" cy="273062"/>
+            <a:off x="2590448" y="4716854"/>
+            <a:ext cx="190346" cy="184353"/>
           </a:xfrm>
           <a:prstGeom prst="ellipse">
             <a:avLst/>
@@ -3515,7 +3517,7 @@
           <a:p>
             <a:pPr algn="ctr"/>
             <a:r>
-              <a:rPr lang="de-DE" sz="1600" b="1" dirty="0">
+              <a:rPr lang="de-DE" sz="1080" b="1" dirty="0">
                 <a:solidFill>
                   <a:srgbClr val="3D96FF"/>
                 </a:solidFill>
@@ -3523,7 +3525,7 @@
               </a:rPr>
               <a:t>7</a:t>
             </a:r>
-            <a:endParaRPr lang="de-DE" sz="1100" b="1" dirty="0">
+            <a:endParaRPr lang="de-DE" sz="743" b="1" dirty="0">
               <a:solidFill>
                 <a:srgbClr val="3D96FF"/>
               </a:solidFill>
@@ -3570,8 +3572,8 @@
         </p:nvSpPr>
         <p:spPr>
           <a:xfrm>
-            <a:off x="116112" y="72570"/>
-            <a:ext cx="6691457" cy="8029750"/>
+            <a:off x="49369" y="66675"/>
+            <a:ext cx="6743069" cy="8010525"/>
           </a:xfrm>
           <a:prstGeom prst="roundRect">
             <a:avLst>
@@ -3609,7 +3611,7 @@
           <a:lstStyle/>
           <a:p>
             <a:pPr algn="ctr"/>
-            <a:endParaRPr lang="de-DE"/>
+            <a:endParaRPr lang="de-DE" sz="1215"/>
           </a:p>
         </p:txBody>
       </p:sp>
@@ -3651,8 +3653,8 @@
         </p:nvGrpSpPr>
         <p:grpSpPr>
           <a:xfrm>
-            <a:off x="50006" y="186135"/>
-            <a:ext cx="6817994" cy="6593934"/>
+            <a:off x="1147740" y="125666"/>
+            <a:ext cx="4603034" cy="4451764"/>
             <a:chOff x="50006" y="186135"/>
             <a:chExt cx="6817994" cy="6593934"/>
           </a:xfrm>
@@ -3773,7 +3775,7 @@
             <a:p>
               <a:pPr algn="ctr"/>
               <a:r>
-                <a:rPr lang="de-DE" sz="1600" b="1" dirty="0" smtClean="0">
+                <a:rPr lang="de-DE" sz="1080" b="1" dirty="0">
                   <a:solidFill>
                     <a:srgbClr val="3D96FF"/>
                   </a:solidFill>
@@ -3781,7 +3783,7 @@
                 </a:rPr>
                 <a:t>1</a:t>
               </a:r>
-              <a:endParaRPr lang="de-DE" sz="1100" b="1" dirty="0">
+              <a:endParaRPr lang="de-DE" sz="743" b="1" dirty="0">
                 <a:solidFill>
                   <a:srgbClr val="3D96FF"/>
                 </a:solidFill>
@@ -3833,7 +3835,7 @@
             <a:p>
               <a:pPr algn="ctr"/>
               <a:r>
-                <a:rPr lang="de-DE" sz="1600" b="1" dirty="0" smtClean="0">
+                <a:rPr lang="de-DE" sz="1080" b="1" dirty="0">
                   <a:solidFill>
                     <a:srgbClr val="3D96FF"/>
                   </a:solidFill>
@@ -3841,7 +3843,7 @@
                 </a:rPr>
                 <a:t>2</a:t>
               </a:r>
-              <a:endParaRPr lang="de-DE" sz="1100" b="1" dirty="0">
+              <a:endParaRPr lang="de-DE" sz="743" b="1" dirty="0">
                 <a:solidFill>
                   <a:srgbClr val="3D96FF"/>
                 </a:solidFill>
@@ -3893,7 +3895,7 @@
             <a:p>
               <a:pPr algn="ctr"/>
               <a:r>
-                <a:rPr lang="de-DE" sz="1600" b="1" dirty="0" smtClean="0">
+                <a:rPr lang="de-DE" sz="1080" b="1" dirty="0">
                   <a:solidFill>
                     <a:srgbClr val="3D96FF"/>
                   </a:solidFill>
@@ -3901,7 +3903,7 @@
                 </a:rPr>
                 <a:t>3</a:t>
               </a:r>
-              <a:endParaRPr lang="de-DE" sz="1100" b="1" dirty="0">
+              <a:endParaRPr lang="de-DE" sz="743" b="1" dirty="0">
                 <a:solidFill>
                   <a:srgbClr val="3D96FF"/>
                 </a:solidFill>
@@ -3953,7 +3955,7 @@
             <a:p>
               <a:pPr algn="ctr"/>
               <a:r>
-                <a:rPr lang="de-DE" sz="1600" b="1" dirty="0">
+                <a:rPr lang="de-DE" sz="1080" b="1" dirty="0">
                   <a:solidFill>
                     <a:srgbClr val="3D96FF"/>
                   </a:solidFill>
@@ -3961,7 +3963,7 @@
                 </a:rPr>
                 <a:t>4</a:t>
               </a:r>
-              <a:endParaRPr lang="de-DE" sz="1100" b="1" dirty="0">
+              <a:endParaRPr lang="de-DE" sz="743" b="1" dirty="0">
                 <a:solidFill>
                   <a:srgbClr val="3D96FF"/>
                 </a:solidFill>
@@ -4013,7 +4015,7 @@
             <a:p>
               <a:pPr algn="ctr"/>
               <a:r>
-                <a:rPr lang="de-DE" sz="1600" b="1" dirty="0" smtClean="0">
+                <a:rPr lang="de-DE" sz="1080" b="1" dirty="0">
                   <a:solidFill>
                     <a:srgbClr val="3D96FF"/>
                   </a:solidFill>
@@ -4021,7 +4023,7 @@
                 </a:rPr>
                 <a:t>5</a:t>
               </a:r>
-              <a:endParaRPr lang="de-DE" sz="1100" b="1" dirty="0">
+              <a:endParaRPr lang="de-DE" sz="743" b="1" dirty="0">
                 <a:solidFill>
                   <a:srgbClr val="3D96FF"/>
                 </a:solidFill>
@@ -4073,7 +4075,7 @@
             <a:p>
               <a:pPr algn="ctr"/>
               <a:r>
-                <a:rPr lang="de-DE" sz="1600" b="1" dirty="0" smtClean="0">
+                <a:rPr lang="de-DE" sz="1080" b="1" dirty="0">
                   <a:solidFill>
                     <a:srgbClr val="3D96FF"/>
                   </a:solidFill>
@@ -4081,7 +4083,7 @@
                 </a:rPr>
                 <a:t>6</a:t>
               </a:r>
-              <a:endParaRPr lang="de-DE" sz="1100" b="1" dirty="0">
+              <a:endParaRPr lang="de-DE" sz="743" b="1" dirty="0">
                 <a:solidFill>
                   <a:srgbClr val="3D96FF"/>
                 </a:solidFill>
@@ -4133,7 +4135,7 @@
             <a:p>
               <a:pPr algn="ctr"/>
               <a:r>
-                <a:rPr lang="de-DE" sz="1600" b="1" dirty="0">
+                <a:rPr lang="de-DE" sz="1080" b="1" dirty="0">
                   <a:solidFill>
                     <a:srgbClr val="3D96FF"/>
                   </a:solidFill>
@@ -4141,7 +4143,7 @@
                 </a:rPr>
                 <a:t>7</a:t>
               </a:r>
-              <a:endParaRPr lang="de-DE" sz="1100" b="1" dirty="0">
+              <a:endParaRPr lang="de-DE" sz="743" b="1" dirty="0">
                 <a:solidFill>
                   <a:srgbClr val="3D96FF"/>
                 </a:solidFill>
@@ -4189,12 +4191,12 @@
         </p:nvSpPr>
         <p:spPr>
           <a:xfrm>
-            <a:off x="80386" y="70339"/>
-            <a:ext cx="6707275" cy="6842927"/>
+            <a:off x="28575" y="523738"/>
+            <a:ext cx="6775601" cy="6912635"/>
           </a:xfrm>
           <a:prstGeom prst="roundRect">
             <a:avLst>
-              <a:gd name="adj" fmla="val 2591"/>
+              <a:gd name="adj" fmla="val 3634"/>
             </a:avLst>
           </a:prstGeom>
           <a:blipFill>
@@ -4228,7 +4230,7 @@
           <a:lstStyle/>
           <a:p>
             <a:pPr algn="ctr"/>
-            <a:endParaRPr lang="de-DE"/>
+            <a:endParaRPr lang="de-DE" sz="1215"/>
           </a:p>
         </p:txBody>
       </p:sp>
@@ -4270,10 +4272,10 @@
         </p:nvGrpSpPr>
         <p:grpSpPr>
           <a:xfrm>
-            <a:off x="203200" y="195001"/>
-            <a:ext cx="6451600" cy="7412300"/>
-            <a:chOff x="0" y="77526"/>
-            <a:chExt cx="6858000" cy="7647249"/>
+            <a:off x="1131126" y="855551"/>
+            <a:ext cx="4336010" cy="5004268"/>
+            <a:chOff x="30955" y="77526"/>
+            <a:chExt cx="6827045" cy="7647249"/>
           </a:xfrm>
         </p:grpSpPr>
         <p:grpSp>
@@ -4284,10 +4286,10 @@
           </p:nvGrpSpPr>
           <p:grpSpPr>
             <a:xfrm>
-              <a:off x="0" y="77526"/>
-              <a:ext cx="6858000" cy="7647249"/>
-              <a:chOff x="0" y="77526"/>
-              <a:chExt cx="6858000" cy="7647249"/>
+              <a:off x="30955" y="77526"/>
+              <a:ext cx="6827045" cy="7647249"/>
+              <a:chOff x="30955" y="77526"/>
+              <a:chExt cx="6827045" cy="7647249"/>
             </a:xfrm>
           </p:grpSpPr>
           <p:pic>
@@ -4298,7 +4300,7 @@
               </p:cNvPicPr>
               <p:nvPr/>
             </p:nvPicPr>
-            <p:blipFill>
+            <p:blipFill rotWithShape="1">
               <a:blip r:embed="rId2" cstate="print">
                 <a:extLst>
                   <a:ext uri="{28A0092B-C50C-407E-A947-70E740481C1C}">
@@ -4306,14 +4308,13 @@
                   </a:ext>
                 </a:extLst>
               </a:blip>
-              <a:stretch>
-                <a:fillRect/>
-              </a:stretch>
+              <a:srcRect l="579"/>
+              <a:stretch/>
             </p:blipFill>
             <p:spPr>
               <a:xfrm>
-                <a:off x="0" y="77526"/>
-                <a:ext cx="6858000" cy="3978797"/>
+                <a:off x="39652" y="77526"/>
+                <a:ext cx="6818348" cy="3978797"/>
               </a:xfrm>
               <a:prstGeom prst="rect">
                 <a:avLst/>
@@ -4336,13 +4337,13 @@
                   </a:ext>
                 </a:extLst>
               </a:blip>
-              <a:srcRect l="488"/>
+              <a:srcRect l="507" r="-1"/>
               <a:stretch/>
             </p:blipFill>
             <p:spPr>
               <a:xfrm>
-                <a:off x="33338" y="3298929"/>
-                <a:ext cx="6807992" cy="3822492"/>
+                <a:off x="34653" y="3298928"/>
+                <a:ext cx="6806676" cy="3822492"/>
               </a:xfrm>
               <a:prstGeom prst="rect">
                 <a:avLst/>
@@ -4422,7 +4423,7 @@
             <a:p>
               <a:pPr algn="ctr"/>
               <a:r>
-                <a:rPr lang="de-DE" sz="1600" b="1" dirty="0" smtClean="0">
+                <a:rPr lang="de-DE" sz="1080" b="1" dirty="0">
                   <a:solidFill>
                     <a:srgbClr val="3D96FF"/>
                   </a:solidFill>
@@ -4430,7 +4431,7 @@
                 </a:rPr>
                 <a:t>1</a:t>
               </a:r>
-              <a:endParaRPr lang="de-DE" sz="1100" b="1" dirty="0">
+              <a:endParaRPr lang="de-DE" sz="743" b="1" dirty="0">
                 <a:solidFill>
                   <a:srgbClr val="3D96FF"/>
                 </a:solidFill>
@@ -4482,7 +4483,7 @@
             <a:p>
               <a:pPr algn="ctr"/>
               <a:r>
-                <a:rPr lang="de-DE" sz="1600" b="1" dirty="0" smtClean="0">
+                <a:rPr lang="de-DE" sz="1080" b="1" dirty="0">
                   <a:solidFill>
                     <a:srgbClr val="3D96FF"/>
                   </a:solidFill>
@@ -4490,7 +4491,7 @@
                 </a:rPr>
                 <a:t>2</a:t>
               </a:r>
-              <a:endParaRPr lang="de-DE" sz="1100" b="1" dirty="0">
+              <a:endParaRPr lang="de-DE" sz="743" b="1" dirty="0">
                 <a:solidFill>
                   <a:srgbClr val="3D96FF"/>
                 </a:solidFill>
@@ -4542,7 +4543,7 @@
             <a:p>
               <a:pPr algn="ctr"/>
               <a:r>
-                <a:rPr lang="de-DE" sz="1600" b="1" dirty="0" smtClean="0">
+                <a:rPr lang="de-DE" sz="1080" b="1" dirty="0">
                   <a:solidFill>
                     <a:srgbClr val="3D96FF"/>
                   </a:solidFill>
@@ -4550,7 +4551,7 @@
                 </a:rPr>
                 <a:t>3</a:t>
               </a:r>
-              <a:endParaRPr lang="de-DE" sz="1100" b="1" dirty="0">
+              <a:endParaRPr lang="de-DE" sz="743" b="1" dirty="0">
                 <a:solidFill>
                   <a:srgbClr val="3D96FF"/>
                 </a:solidFill>
@@ -4602,7 +4603,7 @@
             <a:p>
               <a:pPr algn="ctr"/>
               <a:r>
-                <a:rPr lang="de-DE" sz="1600" b="1" dirty="0" smtClean="0">
+                <a:rPr lang="de-DE" sz="1080" b="1" dirty="0">
                   <a:solidFill>
                     <a:srgbClr val="3D96FF"/>
                   </a:solidFill>
@@ -4610,7 +4611,7 @@
                 </a:rPr>
                 <a:t>4</a:t>
               </a:r>
-              <a:endParaRPr lang="de-DE" sz="1100" b="1" dirty="0">
+              <a:endParaRPr lang="de-DE" sz="743" b="1" dirty="0">
                 <a:solidFill>
                   <a:srgbClr val="3D96FF"/>
                 </a:solidFill>
@@ -4662,7 +4663,7 @@
             <a:p>
               <a:pPr algn="ctr"/>
               <a:r>
-                <a:rPr lang="de-DE" sz="1600" b="1" dirty="0" smtClean="0">
+                <a:rPr lang="de-DE" sz="1080" b="1" dirty="0">
                   <a:solidFill>
                     <a:srgbClr val="3D96FF"/>
                   </a:solidFill>
@@ -4670,7 +4671,7 @@
                 </a:rPr>
                 <a:t>5</a:t>
               </a:r>
-              <a:endParaRPr lang="de-DE" sz="1100" b="1" dirty="0">
+              <a:endParaRPr lang="de-DE" sz="743" b="1" dirty="0">
                 <a:solidFill>
                   <a:srgbClr val="3D96FF"/>
                 </a:solidFill>
@@ -4722,7 +4723,7 @@
             <a:p>
               <a:pPr algn="ctr"/>
               <a:r>
-                <a:rPr lang="de-DE" sz="1600" b="1" dirty="0" smtClean="0">
+                <a:rPr lang="de-DE" sz="1080" b="1" dirty="0">
                   <a:solidFill>
                     <a:srgbClr val="3D96FF"/>
                   </a:solidFill>
@@ -4730,7 +4731,7 @@
                 </a:rPr>
                 <a:t>6</a:t>
               </a:r>
-              <a:endParaRPr lang="de-DE" sz="1100" b="1" dirty="0">
+              <a:endParaRPr lang="de-DE" sz="743" b="1" dirty="0">
                 <a:solidFill>
                   <a:srgbClr val="3D96FF"/>
                 </a:solidFill>
@@ -4782,7 +4783,7 @@
             <a:p>
               <a:pPr algn="ctr"/>
               <a:r>
-                <a:rPr lang="de-DE" sz="1600" b="1" dirty="0">
+                <a:rPr lang="de-DE" sz="1080" b="1" dirty="0">
                   <a:solidFill>
                     <a:srgbClr val="3D96FF"/>
                   </a:solidFill>
@@ -4790,7 +4791,7 @@
                 </a:rPr>
                 <a:t>7</a:t>
               </a:r>
-              <a:endParaRPr lang="de-DE" sz="1100" b="1" dirty="0">
+              <a:endParaRPr lang="de-DE" sz="743" b="1" dirty="0">
                 <a:solidFill>
                   <a:srgbClr val="3D96FF"/>
                 </a:solidFill>
@@ -4838,12 +4839,12 @@
         </p:nvSpPr>
         <p:spPr>
           <a:xfrm>
-            <a:off x="0" y="100484"/>
-            <a:ext cx="6717323" cy="8088923"/>
+            <a:off x="66674" y="57149"/>
+            <a:ext cx="6707955" cy="8039101"/>
           </a:xfrm>
           <a:prstGeom prst="roundRect">
             <a:avLst>
-              <a:gd name="adj" fmla="val 4345"/>
+              <a:gd name="adj" fmla="val 3109"/>
             </a:avLst>
           </a:prstGeom>
           <a:blipFill>
@@ -4877,7 +4878,7 @@
           <a:lstStyle/>
           <a:p>
             <a:pPr algn="ctr"/>
-            <a:endParaRPr lang="de-DE"/>
+            <a:endParaRPr lang="de-DE" sz="1215"/>
           </a:p>
         </p:txBody>
       </p:sp>
@@ -4919,8 +4920,8 @@
         </p:nvGrpSpPr>
         <p:grpSpPr>
           <a:xfrm>
-            <a:off x="66674" y="0"/>
-            <a:ext cx="6807200" cy="7308850"/>
+            <a:off x="1158993" y="1"/>
+            <a:ext cx="4595746" cy="4934426"/>
             <a:chOff x="66674" y="0"/>
             <a:chExt cx="6807200" cy="7308850"/>
           </a:xfrm>
@@ -5070,7 +5071,7 @@
             <a:p>
               <a:pPr algn="ctr"/>
               <a:r>
-                <a:rPr lang="de-DE" sz="1600" b="1" dirty="0" smtClean="0">
+                <a:rPr lang="de-DE" sz="1080" b="1" dirty="0">
                   <a:solidFill>
                     <a:srgbClr val="3D96FF"/>
                   </a:solidFill>
@@ -5078,7 +5079,7 @@
                 </a:rPr>
                 <a:t>1</a:t>
               </a:r>
-              <a:endParaRPr lang="de-DE" sz="1100" b="1" dirty="0">
+              <a:endParaRPr lang="de-DE" sz="743" b="1" dirty="0">
                 <a:solidFill>
                   <a:srgbClr val="3D96FF"/>
                 </a:solidFill>
@@ -5130,7 +5131,7 @@
             <a:p>
               <a:pPr algn="ctr"/>
               <a:r>
-                <a:rPr lang="de-DE" sz="1600" b="1" dirty="0">
+                <a:rPr lang="de-DE" sz="1080" b="1" dirty="0">
                   <a:solidFill>
                     <a:srgbClr val="3D96FF"/>
                   </a:solidFill>
@@ -5138,7 +5139,7 @@
                 </a:rPr>
                 <a:t>2</a:t>
               </a:r>
-              <a:endParaRPr lang="de-DE" sz="1100" b="1" dirty="0">
+              <a:endParaRPr lang="de-DE" sz="743" b="1" dirty="0">
                 <a:solidFill>
                   <a:srgbClr val="3D96FF"/>
                 </a:solidFill>
@@ -5190,7 +5191,7 @@
             <a:p>
               <a:pPr algn="ctr"/>
               <a:r>
-                <a:rPr lang="de-DE" sz="1600" b="1" dirty="0">
+                <a:rPr lang="de-DE" sz="1080" b="1" dirty="0">
                   <a:solidFill>
                     <a:srgbClr val="3D96FF"/>
                   </a:solidFill>
@@ -5198,7 +5199,7 @@
                 </a:rPr>
                 <a:t>3</a:t>
               </a:r>
-              <a:endParaRPr lang="de-DE" sz="1100" b="1" dirty="0">
+              <a:endParaRPr lang="de-DE" sz="743" b="1" dirty="0">
                 <a:solidFill>
                   <a:srgbClr val="3D96FF"/>
                 </a:solidFill>
@@ -5250,7 +5251,7 @@
             <a:p>
               <a:pPr algn="ctr"/>
               <a:r>
-                <a:rPr lang="de-DE" sz="1600" b="1" dirty="0">
+                <a:rPr lang="de-DE" sz="1080" b="1" dirty="0">
                   <a:solidFill>
                     <a:srgbClr val="3D96FF"/>
                   </a:solidFill>
@@ -5258,7 +5259,7 @@
                 </a:rPr>
                 <a:t>4</a:t>
               </a:r>
-              <a:endParaRPr lang="de-DE" sz="1100" b="1" dirty="0">
+              <a:endParaRPr lang="de-DE" sz="743" b="1" dirty="0">
                 <a:solidFill>
                   <a:srgbClr val="3D96FF"/>
                 </a:solidFill>
@@ -5310,7 +5311,7 @@
             <a:p>
               <a:pPr algn="ctr"/>
               <a:r>
-                <a:rPr lang="de-DE" sz="1600" b="1" dirty="0">
+                <a:rPr lang="de-DE" sz="1080" b="1" dirty="0">
                   <a:solidFill>
                     <a:srgbClr val="3D96FF"/>
                   </a:solidFill>
@@ -5318,7 +5319,7 @@
                 </a:rPr>
                 <a:t>5</a:t>
               </a:r>
-              <a:endParaRPr lang="de-DE" sz="1100" b="1" dirty="0">
+              <a:endParaRPr lang="de-DE" sz="743" b="1" dirty="0">
                 <a:solidFill>
                   <a:srgbClr val="3D96FF"/>
                 </a:solidFill>
@@ -5370,7 +5371,7 @@
             <a:p>
               <a:pPr algn="ctr"/>
               <a:r>
-                <a:rPr lang="de-DE" sz="1600" b="1" dirty="0">
+                <a:rPr lang="de-DE" sz="1080" b="1" dirty="0">
                   <a:solidFill>
                     <a:srgbClr val="3D96FF"/>
                   </a:solidFill>
@@ -5378,7 +5379,7 @@
                 </a:rPr>
                 <a:t>6</a:t>
               </a:r>
-              <a:endParaRPr lang="de-DE" sz="1100" b="1" dirty="0">
+              <a:endParaRPr lang="de-DE" sz="743" b="1" dirty="0">
                 <a:solidFill>
                   <a:srgbClr val="3D96FF"/>
                 </a:solidFill>
@@ -5426,8 +5427,8 @@
         </p:nvSpPr>
         <p:spPr>
           <a:xfrm>
-            <a:off x="130629" y="200967"/>
-            <a:ext cx="6621863" cy="8078875"/>
+            <a:off x="40121" y="123825"/>
+            <a:ext cx="6746706" cy="7896225"/>
           </a:xfrm>
           <a:prstGeom prst="roundRect">
             <a:avLst>
@@ -5465,7 +5466,7 @@
           <a:lstStyle/>
           <a:p>
             <a:pPr algn="ctr"/>
-            <a:endParaRPr lang="de-DE"/>
+            <a:endParaRPr lang="de-DE" sz="1215"/>
           </a:p>
         </p:txBody>
       </p:sp>
@@ -5507,12 +5508,12 @@
         </p:nvSpPr>
         <p:spPr>
           <a:xfrm>
-            <a:off x="190500" y="88900"/>
-            <a:ext cx="6515100" cy="6210300"/>
+            <a:off x="404391" y="1041095"/>
+            <a:ext cx="6092405" cy="5807380"/>
           </a:xfrm>
           <a:prstGeom prst="roundRect">
             <a:avLst>
-              <a:gd name="adj" fmla="val 2451"/>
+              <a:gd name="adj" fmla="val 4041"/>
             </a:avLst>
           </a:prstGeom>
           <a:blipFill>
@@ -5547,7 +5548,7 @@
           <a:lstStyle/>
           <a:p>
             <a:pPr algn="ctr"/>
-            <a:endParaRPr lang="de-DE"/>
+            <a:endParaRPr lang="de-DE" sz="1215"/>
           </a:p>
         </p:txBody>
       </p:sp>
@@ -5567,7 +5568,7 @@
 <file path=ppt/theme/theme1.xml><?xml version="1.0" encoding="utf-8"?>
 <a:theme xmlns:a="http://schemas.openxmlformats.org/drawingml/2006/main" name="Office Theme">
   <a:themeElements>
-    <a:clrScheme name="Office">
+    <a:clrScheme name="Office Theme">
       <a:dk1>
         <a:sysClr val="windowText" lastClr="000000"/>
       </a:dk1>
@@ -5605,7 +5606,7 @@
         <a:srgbClr val="954F72"/>
       </a:folHlink>
     </a:clrScheme>
-    <a:fontScheme name="Office">
+    <a:fontScheme name="Office Theme">
       <a:majorFont>
         <a:latin typeface="Calibri Light" panose="020F0302020204030204"/>
         <a:ea typeface=""/>
@@ -5677,7 +5678,7 @@
         <a:font script="Geor" typeface="Sylfaen"/>
       </a:minorFont>
     </a:fontScheme>
-    <a:fmtScheme name="Office">
+    <a:fmtScheme name="Office Theme">
       <a:fillStyleLst>
         <a:solidFill>
           <a:schemeClr val="phClr"/>

</xml_diff>

<commit_message>
Updated code and tutorial
</commit_message>
<xml_diff>
--- a/www/tut/2023 05 03 Tutorial.pptx
+++ b/www/tut/2023 05 03 Tutorial.pptx
@@ -3019,35 +3019,35 @@
       </p:grpSpPr>
       <p:grpSp>
         <p:nvGrpSpPr>
-          <p:cNvPr id="13" name="Group 12"/>
+          <p:cNvPr id="20" name="Group 19"/>
           <p:cNvGrpSpPr/>
           <p:nvPr/>
         </p:nvGrpSpPr>
         <p:grpSpPr>
           <a:xfrm>
-            <a:off x="1148275" y="8339"/>
-            <a:ext cx="4590537" cy="5290489"/>
-            <a:chOff x="1148275" y="8339"/>
-            <a:chExt cx="4590537" cy="5290489"/>
+            <a:off x="230980" y="211938"/>
+            <a:ext cx="6291740" cy="7227088"/>
+            <a:chOff x="230980" y="211938"/>
+            <a:chExt cx="6291740" cy="7227088"/>
           </a:xfrm>
         </p:grpSpPr>
         <p:grpSp>
           <p:nvGrpSpPr>
-            <p:cNvPr id="5" name="Group 4"/>
+            <p:cNvPr id="19" name="Group 18"/>
             <p:cNvGrpSpPr/>
             <p:nvPr/>
           </p:nvGrpSpPr>
           <p:grpSpPr>
             <a:xfrm>
-              <a:off x="1148275" y="8339"/>
-              <a:ext cx="4590537" cy="5290489"/>
-              <a:chOff x="50800" y="0"/>
-              <a:chExt cx="6799484" cy="7836250"/>
+              <a:off x="230980" y="211938"/>
+              <a:ext cx="6291740" cy="7227088"/>
+              <a:chOff x="230980" y="211938"/>
+              <a:chExt cx="6291740" cy="7227088"/>
             </a:xfrm>
           </p:grpSpPr>
           <p:pic>
             <p:nvPicPr>
-              <p:cNvPr id="2" name="Picture 1"/>
+              <p:cNvPr id="16" name="Picture 15"/>
               <p:cNvPicPr>
                 <a:picLocks noChangeAspect="1"/>
               </p:cNvPicPr>
@@ -3061,13 +3061,13 @@
                   </a:ext>
                 </a:extLst>
               </a:blip>
-              <a:srcRect l="742" r="420"/>
+              <a:srcRect l="1123" b="5586"/>
               <a:stretch/>
             </p:blipFill>
             <p:spPr>
               <a:xfrm>
-                <a:off x="50800" y="0"/>
-                <a:ext cx="6778322" cy="3977063"/>
+                <a:off x="230980" y="4966226"/>
+                <a:ext cx="6284119" cy="2472800"/>
               </a:xfrm>
               <a:prstGeom prst="rect">
                 <a:avLst/>
@@ -3076,7 +3076,7 @@
           </p:pic>
           <p:pic>
             <p:nvPicPr>
-              <p:cNvPr id="3" name="Picture 2"/>
+              <p:cNvPr id="15" name="Picture 14"/>
               <p:cNvPicPr>
                 <a:picLocks noChangeAspect="1"/>
               </p:cNvPicPr>
@@ -3090,13 +3090,13 @@
                   </a:ext>
                 </a:extLst>
               </a:blip>
-              <a:srcRect l="697" t="8113" r="-258" b="1"/>
+              <a:srcRect l="835"/>
               <a:stretch/>
             </p:blipFill>
             <p:spPr>
               <a:xfrm>
-                <a:off x="57148" y="3791606"/>
-                <a:ext cx="6793136" cy="3671745"/>
+                <a:off x="233363" y="3413129"/>
+                <a:ext cx="6289357" cy="3690954"/>
               </a:xfrm>
               <a:prstGeom prst="rect">
                 <a:avLst/>
@@ -3105,7 +3105,7 @@
           </p:pic>
           <p:pic>
             <p:nvPicPr>
-              <p:cNvPr id="4" name="Picture 3"/>
+              <p:cNvPr id="14" name="Picture 13"/>
               <p:cNvPicPr>
                 <a:picLocks noChangeAspect="1"/>
               </p:cNvPicPr>
@@ -3119,13 +3119,13 @@
                   </a:ext>
                 </a:extLst>
               </a:blip>
-              <a:srcRect l="879" r="306" b="3557"/>
+              <a:srcRect l="833" t="-1" b="-799"/>
               <a:stretch/>
             </p:blipFill>
             <p:spPr>
               <a:xfrm>
-                <a:off x="57151" y="5310325"/>
-                <a:ext cx="6776675" cy="2525925"/>
+                <a:off x="233363" y="211938"/>
+                <a:ext cx="6281737" cy="3702837"/>
               </a:xfrm>
               <a:prstGeom prst="rect">
                 <a:avLst/>
@@ -3141,8 +3141,8 @@
           </p:nvSpPr>
           <p:spPr>
             <a:xfrm>
-              <a:off x="2400102" y="2685035"/>
-              <a:ext cx="190346" cy="184353"/>
+              <a:off x="1955541" y="4205941"/>
+              <a:ext cx="263236" cy="254948"/>
             </a:xfrm>
             <a:prstGeom prst="ellipse">
               <a:avLst/>
@@ -3201,8 +3201,8 @@
           </p:nvSpPr>
           <p:spPr>
             <a:xfrm>
-              <a:off x="2400102" y="3019089"/>
-              <a:ext cx="190346" cy="184353"/>
+              <a:off x="1955541" y="4838751"/>
+              <a:ext cx="263236" cy="254948"/>
             </a:xfrm>
             <a:prstGeom prst="ellipse">
               <a:avLst/>
@@ -3261,8 +3261,8 @@
           </p:nvSpPr>
           <p:spPr>
             <a:xfrm>
-              <a:off x="2400102" y="3790091"/>
-              <a:ext cx="190346" cy="184353"/>
+              <a:off x="1955541" y="6027675"/>
+              <a:ext cx="263236" cy="254948"/>
             </a:xfrm>
             <a:prstGeom prst="ellipse">
               <a:avLst/>
@@ -3321,8 +3321,8 @@
           </p:nvSpPr>
           <p:spPr>
             <a:xfrm>
-              <a:off x="2055420" y="4232518"/>
-              <a:ext cx="190346" cy="184353"/>
+              <a:off x="1539830" y="6486361"/>
+              <a:ext cx="263236" cy="254948"/>
             </a:xfrm>
             <a:prstGeom prst="ellipse">
               <a:avLst/>
@@ -3381,8 +3381,8 @@
           </p:nvSpPr>
           <p:spPr>
             <a:xfrm>
-              <a:off x="4061773" y="592990"/>
-              <a:ext cx="190346" cy="184353"/>
+              <a:off x="4154459" y="912122"/>
+              <a:ext cx="263236" cy="254948"/>
             </a:xfrm>
             <a:prstGeom prst="ellipse">
               <a:avLst/>
@@ -3441,8 +3441,8 @@
           </p:nvSpPr>
           <p:spPr>
             <a:xfrm>
-              <a:off x="4895181" y="2685035"/>
-              <a:ext cx="190346" cy="184353"/>
+              <a:off x="5299386" y="4205941"/>
+              <a:ext cx="263236" cy="254948"/>
             </a:xfrm>
             <a:prstGeom prst="ellipse">
               <a:avLst/>
@@ -3501,8 +3501,8 @@
           </p:nvSpPr>
           <p:spPr>
             <a:xfrm>
-              <a:off x="2590448" y="4716854"/>
-              <a:ext cx="190346" cy="184353"/>
+              <a:off x="2294977" y="6884337"/>
+              <a:ext cx="263236" cy="254948"/>
             </a:xfrm>
             <a:prstGeom prst="ellipse">
               <a:avLst/>
@@ -3597,7 +3597,7 @@
           </a:xfrm>
           <a:prstGeom prst="roundRect">
             <a:avLst>
-              <a:gd name="adj" fmla="val 3510"/>
+              <a:gd name="adj" fmla="val 2520"/>
             </a:avLst>
           </a:prstGeom>
           <a:blipFill>
@@ -3674,10 +3674,10 @@
         </p:nvGrpSpPr>
         <p:grpSpPr>
           <a:xfrm>
-            <a:off x="1147741" y="125666"/>
-            <a:ext cx="4596282" cy="4451764"/>
-            <a:chOff x="50007" y="186135"/>
-            <a:chExt cx="6807992" cy="6593934"/>
+            <a:off x="1150144" y="125666"/>
+            <a:ext cx="4593879" cy="4451764"/>
+            <a:chOff x="53566" y="186135"/>
+            <a:chExt cx="6804433" cy="6593934"/>
           </a:xfrm>
         </p:grpSpPr>
         <p:grpSp>
@@ -3688,10 +3688,10 @@
           </p:nvGrpSpPr>
           <p:grpSpPr>
             <a:xfrm>
-              <a:off x="50007" y="186135"/>
-              <a:ext cx="6807992" cy="6593934"/>
-              <a:chOff x="50007" y="186135"/>
-              <a:chExt cx="6807992" cy="6593934"/>
+              <a:off x="53566" y="186135"/>
+              <a:ext cx="6804433" cy="6593934"/>
+              <a:chOff x="53566" y="186135"/>
+              <a:chExt cx="6804433" cy="6593934"/>
             </a:xfrm>
           </p:grpSpPr>
           <p:pic>
@@ -3739,13 +3739,13 @@
                   </a:ext>
                 </a:extLst>
               </a:blip>
-              <a:srcRect l="583" t="8139" r="224"/>
+              <a:srcRect l="635" t="8139" r="225"/>
               <a:stretch/>
             </p:blipFill>
             <p:spPr>
               <a:xfrm>
-                <a:off x="50007" y="3703319"/>
-                <a:ext cx="6802628" cy="3076750"/>
+                <a:off x="53566" y="3703319"/>
+                <a:ext cx="6799069" cy="3076750"/>
               </a:xfrm>
               <a:prstGeom prst="rect">
                 <a:avLst/>

</xml_diff>